<commit_message>
Added landing page to design
</commit_message>
<xml_diff>
--- a/fhrhdai.pptx
+++ b/fhrhdai.pptx
@@ -6,6 +6,9 @@
   </p:sldMasterIdLst>
   <p:sldIdLst>
     <p:sldId id="256" r:id="rId2"/>
+    <p:sldId id="257" r:id="rId3"/>
+    <p:sldId id="259" r:id="rId4"/>
+    <p:sldId id="260" r:id="rId5"/>
   </p:sldIdLst>
   <p:sldSz cx="12192000" cy="6858000"/>
   <p:notesSz cx="6858000" cy="9144000"/>
@@ -104,7 +107,367 @@
       </a:defRPr>
     </a:lvl9pPr>
   </p:defaultTextStyle>
+  <p:extLst>
+    <p:ext uri="{521415D9-36F7-43E2-AB2F-B90AF26B5E84}">
+      <p14:sectionLst xmlns:p14="http://schemas.microsoft.com/office/powerpoint/2010/main">
+        <p14:section name="info" id="{2676B14C-987F-414B-A23D-44B096951192}">
+          <p14:sldIdLst>
+            <p14:sldId id="256"/>
+          </p14:sldIdLst>
+        </p14:section>
+        <p14:section name="Landing Page" id="{A8D46849-E031-4D13-8AB1-AA4958B42234}">
+          <p14:sldIdLst>
+            <p14:sldId id="257"/>
+            <p14:sldId id="259"/>
+            <p14:sldId id="260"/>
+          </p14:sldIdLst>
+        </p14:section>
+      </p14:sectionLst>
+    </p:ext>
+    <p:ext uri="{EFAFB233-063F-42B5-8137-9DF3F51BA10A}">
+      <p15:sldGuideLst xmlns:p15="http://schemas.microsoft.com/office/powerpoint/2012/main"/>
+    </p:ext>
+  </p:extLst>
 </p:presentation>
+</file>
+
+<file path=ppt/commentAuthors.xml><?xml version="1.0" encoding="utf-8"?>
+<p:cmAuthorLst xmlns:a="http://schemas.openxmlformats.org/drawingml/2006/main" xmlns:r="http://schemas.openxmlformats.org/officeDocument/2006/relationships" xmlns:p="http://schemas.openxmlformats.org/presentationml/2006/main">
+  <p:cmAuthor id="1" name="Mad Scientist" initials="MS" lastIdx="1" clrIdx="0">
+    <p:extLst>
+      <p:ext uri="{19B8F6BF-5375-455C-9EA6-DF929625EA0E}">
+        <p15:presenceInfo xmlns:p15="http://schemas.microsoft.com/office/powerpoint/2012/main" userId="e4c58536287370fd" providerId="Windows Live"/>
+      </p:ext>
+    </p:extLst>
+  </p:cmAuthor>
+</p:cmAuthorLst>
+</file>
+
+<file path=ppt/revisionInfo.xml><?xml version="1.0" encoding="utf-8"?>
+<p1510:revInfo xmlns:a="http://schemas.openxmlformats.org/drawingml/2006/main" xmlns:r="http://schemas.openxmlformats.org/officeDocument/2006/relationships" xmlns:p1510="http://schemas.microsoft.com/office/powerpoint/2015/10/main">
+  <p1510:revLst>
+    <p1510:client id="{8E27B28E-0CA7-4ABF-B227-2DEC33884432}" v="68" dt="2020-04-17T14:03:19.381"/>
+  </p1510:revLst>
+</p1510:revInfo>
+</file>
+
+<file path=ppt/changesInfos/changesInfo1.xml><?xml version="1.0" encoding="utf-8"?>
+<pc:chgInfo xmlns:a="http://schemas.openxmlformats.org/drawingml/2006/main" xmlns:r="http://schemas.openxmlformats.org/officeDocument/2006/relationships" xmlns:ac="http://schemas.microsoft.com/office/drawing/2013/main/command" xmlns:pc="http://schemas.microsoft.com/office/powerpoint/2013/main/command">
+  <pc:docChgLst>
+    <pc:chgData name="Mad Scientist" userId="e4c58536287370fd" providerId="LiveId" clId="{8E27B28E-0CA7-4ABF-B227-2DEC33884432}"/>
+    <pc:docChg chg="undo custSel addSld delSld modSld modSection">
+      <pc:chgData name="Mad Scientist" userId="e4c58536287370fd" providerId="LiveId" clId="{8E27B28E-0CA7-4ABF-B227-2DEC33884432}" dt="2020-04-17T14:07:26.382" v="451" actId="14100"/>
+      <pc:docMkLst>
+        <pc:docMk/>
+      </pc:docMkLst>
+      <pc:sldChg chg="addSp delSp modSp add setBg addCm modCm">
+        <pc:chgData name="Mad Scientist" userId="e4c58536287370fd" providerId="LiveId" clId="{8E27B28E-0CA7-4ABF-B227-2DEC33884432}" dt="2020-04-17T14:07:26.382" v="451" actId="14100"/>
+        <pc:sldMkLst>
+          <pc:docMk/>
+          <pc:sldMk cId="3861153024" sldId="257"/>
+        </pc:sldMkLst>
+        <pc:spChg chg="del">
+          <ac:chgData name="Mad Scientist" userId="e4c58536287370fd" providerId="LiveId" clId="{8E27B28E-0CA7-4ABF-B227-2DEC33884432}" dt="2020-04-17T13:12:01.906" v="1"/>
+          <ac:spMkLst>
+            <pc:docMk/>
+            <pc:sldMk cId="3861153024" sldId="257"/>
+            <ac:spMk id="2" creationId="{9A0B0C7A-5829-4F33-9732-3F08F931622C}"/>
+          </ac:spMkLst>
+        </pc:spChg>
+        <pc:spChg chg="del">
+          <ac:chgData name="Mad Scientist" userId="e4c58536287370fd" providerId="LiveId" clId="{8E27B28E-0CA7-4ABF-B227-2DEC33884432}" dt="2020-04-17T13:12:01.906" v="1"/>
+          <ac:spMkLst>
+            <pc:docMk/>
+            <pc:sldMk cId="3861153024" sldId="257"/>
+            <ac:spMk id="3" creationId="{4659B014-0885-41EC-BF5B-CD9553FE56CC}"/>
+          </ac:spMkLst>
+        </pc:spChg>
+        <pc:spChg chg="add del mod">
+          <ac:chgData name="Mad Scientist" userId="e4c58536287370fd" providerId="LiveId" clId="{8E27B28E-0CA7-4ABF-B227-2DEC33884432}" dt="2020-04-17T13:13:28.054" v="8" actId="478"/>
+          <ac:spMkLst>
+            <pc:docMk/>
+            <pc:sldMk cId="3861153024" sldId="257"/>
+            <ac:spMk id="4" creationId="{53DD0194-7B41-4D68-A964-09A8D44B4194}"/>
+          </ac:spMkLst>
+        </pc:spChg>
+        <pc:spChg chg="add del mod">
+          <ac:chgData name="Mad Scientist" userId="e4c58536287370fd" providerId="LiveId" clId="{8E27B28E-0CA7-4ABF-B227-2DEC33884432}" dt="2020-04-17T13:13:42.461" v="9" actId="478"/>
+          <ac:spMkLst>
+            <pc:docMk/>
+            <pc:sldMk cId="3861153024" sldId="257"/>
+            <ac:spMk id="5" creationId="{B4350F26-D3E2-460A-A294-75657E8202ED}"/>
+          </ac:spMkLst>
+        </pc:spChg>
+        <pc:spChg chg="add del mod">
+          <ac:chgData name="Mad Scientist" userId="e4c58536287370fd" providerId="LiveId" clId="{8E27B28E-0CA7-4ABF-B227-2DEC33884432}" dt="2020-04-17T13:14:48.146" v="12"/>
+          <ac:spMkLst>
+            <pc:docMk/>
+            <pc:sldMk cId="3861153024" sldId="257"/>
+            <ac:spMk id="6" creationId="{A8AAA5CC-C809-4EB1-B79B-CD41C1B88FB4}"/>
+          </ac:spMkLst>
+        </pc:spChg>
+        <pc:spChg chg="add del mod">
+          <ac:chgData name="Mad Scientist" userId="e4c58536287370fd" providerId="LiveId" clId="{8E27B28E-0CA7-4ABF-B227-2DEC33884432}" dt="2020-04-17T13:36:30.568" v="70" actId="478"/>
+          <ac:spMkLst>
+            <pc:docMk/>
+            <pc:sldMk cId="3861153024" sldId="257"/>
+            <ac:spMk id="7" creationId="{352CBB90-B6E1-43EC-ACB3-1FDF3F240841}"/>
+          </ac:spMkLst>
+        </pc:spChg>
+        <pc:spChg chg="add del mod">
+          <ac:chgData name="Mad Scientist" userId="e4c58536287370fd" providerId="LiveId" clId="{8E27B28E-0CA7-4ABF-B227-2DEC33884432}" dt="2020-04-17T13:17:22.844" v="32" actId="478"/>
+          <ac:spMkLst>
+            <pc:docMk/>
+            <pc:sldMk cId="3861153024" sldId="257"/>
+            <ac:spMk id="8" creationId="{CE12815F-BE19-4505-8495-E10E8E0759A7}"/>
+          </ac:spMkLst>
+        </pc:spChg>
+        <pc:spChg chg="add del mod">
+          <ac:chgData name="Mad Scientist" userId="e4c58536287370fd" providerId="LiveId" clId="{8E27B28E-0CA7-4ABF-B227-2DEC33884432}" dt="2020-04-17T13:22:33.379" v="43" actId="478"/>
+          <ac:spMkLst>
+            <pc:docMk/>
+            <pc:sldMk cId="3861153024" sldId="257"/>
+            <ac:spMk id="9" creationId="{E6F6CD55-F1C3-4DDF-B466-B86A69171BEA}"/>
+          </ac:spMkLst>
+        </pc:spChg>
+        <pc:spChg chg="add del mod">
+          <ac:chgData name="Mad Scientist" userId="e4c58536287370fd" providerId="LiveId" clId="{8E27B28E-0CA7-4ABF-B227-2DEC33884432}" dt="2020-04-17T13:19:04.589" v="34" actId="478"/>
+          <ac:spMkLst>
+            <pc:docMk/>
+            <pc:sldMk cId="3861153024" sldId="257"/>
+            <ac:spMk id="11" creationId="{7CBEBBEB-A618-4A2A-9BD3-617145111336}"/>
+          </ac:spMkLst>
+        </pc:spChg>
+        <pc:spChg chg="add mod">
+          <ac:chgData name="Mad Scientist" userId="e4c58536287370fd" providerId="LiveId" clId="{8E27B28E-0CA7-4ABF-B227-2DEC33884432}" dt="2020-04-17T13:45:55.349" v="246" actId="207"/>
+          <ac:spMkLst>
+            <pc:docMk/>
+            <pc:sldMk cId="3861153024" sldId="257"/>
+            <ac:spMk id="12" creationId="{29381AB7-125A-4251-A8C8-11EBE6B95637}"/>
+          </ac:spMkLst>
+        </pc:spChg>
+        <pc:spChg chg="add mod">
+          <ac:chgData name="Mad Scientist" userId="e4c58536287370fd" providerId="LiveId" clId="{8E27B28E-0CA7-4ABF-B227-2DEC33884432}" dt="2020-04-17T13:37:52.333" v="84" actId="1076"/>
+          <ac:spMkLst>
+            <pc:docMk/>
+            <pc:sldMk cId="3861153024" sldId="257"/>
+            <ac:spMk id="13" creationId="{6840699F-79A2-4BEB-AD0D-0178151A40C2}"/>
+          </ac:spMkLst>
+        </pc:spChg>
+        <pc:spChg chg="add mod">
+          <ac:chgData name="Mad Scientist" userId="e4c58536287370fd" providerId="LiveId" clId="{8E27B28E-0CA7-4ABF-B227-2DEC33884432}" dt="2020-04-17T13:37:39.925" v="82" actId="1076"/>
+          <ac:spMkLst>
+            <pc:docMk/>
+            <pc:sldMk cId="3861153024" sldId="257"/>
+            <ac:spMk id="14" creationId="{8817FE8E-E295-4E31-80CF-FD1A325C1D31}"/>
+          </ac:spMkLst>
+        </pc:spChg>
+        <pc:spChg chg="add mod">
+          <ac:chgData name="Mad Scientist" userId="e4c58536287370fd" providerId="LiveId" clId="{8E27B28E-0CA7-4ABF-B227-2DEC33884432}" dt="2020-04-17T13:37:55.305" v="85" actId="1076"/>
+          <ac:spMkLst>
+            <pc:docMk/>
+            <pc:sldMk cId="3861153024" sldId="257"/>
+            <ac:spMk id="15" creationId="{0ADE8F13-B377-499F-8E8A-3FB267F67AD7}"/>
+          </ac:spMkLst>
+        </pc:spChg>
+        <pc:spChg chg="add mod">
+          <ac:chgData name="Mad Scientist" userId="e4c58536287370fd" providerId="LiveId" clId="{8E27B28E-0CA7-4ABF-B227-2DEC33884432}" dt="2020-04-17T13:39:34.707" v="101" actId="1076"/>
+          <ac:spMkLst>
+            <pc:docMk/>
+            <pc:sldMk cId="3861153024" sldId="257"/>
+            <ac:spMk id="16" creationId="{5923FE38-DC71-48CA-985B-B27E7852FAE7}"/>
+          </ac:spMkLst>
+        </pc:spChg>
+        <pc:spChg chg="add mod">
+          <ac:chgData name="Mad Scientist" userId="e4c58536287370fd" providerId="LiveId" clId="{8E27B28E-0CA7-4ABF-B227-2DEC33884432}" dt="2020-04-17T13:43:16.791" v="244" actId="20577"/>
+          <ac:spMkLst>
+            <pc:docMk/>
+            <pc:sldMk cId="3861153024" sldId="257"/>
+            <ac:spMk id="17" creationId="{91321A39-79C8-4DC8-AEF7-C9B8EDECD131}"/>
+          </ac:spMkLst>
+        </pc:spChg>
+        <pc:spChg chg="add del mod">
+          <ac:chgData name="Mad Scientist" userId="e4c58536287370fd" providerId="LiveId" clId="{8E27B28E-0CA7-4ABF-B227-2DEC33884432}" dt="2020-04-17T13:46:28.470" v="250"/>
+          <ac:spMkLst>
+            <pc:docMk/>
+            <pc:sldMk cId="3861153024" sldId="257"/>
+            <ac:spMk id="18" creationId="{97ED1359-A254-49B4-8DBA-3A0CB710BE0F}"/>
+          </ac:spMkLst>
+        </pc:spChg>
+        <pc:spChg chg="add del mod">
+          <ac:chgData name="Mad Scientist" userId="e4c58536287370fd" providerId="LiveId" clId="{8E27B28E-0CA7-4ABF-B227-2DEC33884432}" dt="2020-04-17T13:46:28.470" v="250"/>
+          <ac:spMkLst>
+            <pc:docMk/>
+            <pc:sldMk cId="3861153024" sldId="257"/>
+            <ac:spMk id="19" creationId="{54D7EC75-8B94-404A-A702-FDD4E3C9460D}"/>
+          </ac:spMkLst>
+        </pc:spChg>
+        <pc:spChg chg="add del mod">
+          <ac:chgData name="Mad Scientist" userId="e4c58536287370fd" providerId="LiveId" clId="{8E27B28E-0CA7-4ABF-B227-2DEC33884432}" dt="2020-04-17T13:46:28.470" v="250"/>
+          <ac:spMkLst>
+            <pc:docMk/>
+            <pc:sldMk cId="3861153024" sldId="257"/>
+            <ac:spMk id="20" creationId="{08563DA7-6822-4839-861D-E9ACB106C646}"/>
+          </ac:spMkLst>
+        </pc:spChg>
+        <pc:spChg chg="add mod">
+          <ac:chgData name="Mad Scientist" userId="e4c58536287370fd" providerId="LiveId" clId="{8E27B28E-0CA7-4ABF-B227-2DEC33884432}" dt="2020-04-17T13:46:59.334" v="252" actId="1076"/>
+          <ac:spMkLst>
+            <pc:docMk/>
+            <pc:sldMk cId="3861153024" sldId="257"/>
+            <ac:spMk id="21" creationId="{0733964E-44B3-44C4-AD40-1768EDB43325}"/>
+          </ac:spMkLst>
+        </pc:spChg>
+        <pc:spChg chg="add mod">
+          <ac:chgData name="Mad Scientist" userId="e4c58536287370fd" providerId="LiveId" clId="{8E27B28E-0CA7-4ABF-B227-2DEC33884432}" dt="2020-04-17T14:06:42.389" v="449" actId="1076"/>
+          <ac:spMkLst>
+            <pc:docMk/>
+            <pc:sldMk cId="3861153024" sldId="257"/>
+            <ac:spMk id="22" creationId="{051A1F26-830D-4B05-A7E0-59CBB3C82E74}"/>
+          </ac:spMkLst>
+        </pc:spChg>
+        <pc:spChg chg="add mod">
+          <ac:chgData name="Mad Scientist" userId="e4c58536287370fd" providerId="LiveId" clId="{8E27B28E-0CA7-4ABF-B227-2DEC33884432}" dt="2020-04-17T13:46:59.334" v="252" actId="1076"/>
+          <ac:spMkLst>
+            <pc:docMk/>
+            <pc:sldMk cId="3861153024" sldId="257"/>
+            <ac:spMk id="23" creationId="{2BF92073-F8C6-4DD7-8744-5EC725E766DB}"/>
+          </ac:spMkLst>
+        </pc:spChg>
+        <pc:spChg chg="add del mod">
+          <ac:chgData name="Mad Scientist" userId="e4c58536287370fd" providerId="LiveId" clId="{8E27B28E-0CA7-4ABF-B227-2DEC33884432}" dt="2020-04-17T13:48:35.061" v="253" actId="478"/>
+          <ac:spMkLst>
+            <pc:docMk/>
+            <pc:sldMk cId="3861153024" sldId="257"/>
+            <ac:spMk id="24" creationId="{07B76DCC-5A65-474C-9355-7E446248AAB1}"/>
+          </ac:spMkLst>
+        </pc:spChg>
+        <pc:spChg chg="add del mod">
+          <ac:chgData name="Mad Scientist" userId="e4c58536287370fd" providerId="LiveId" clId="{8E27B28E-0CA7-4ABF-B227-2DEC33884432}" dt="2020-04-17T13:48:50.101" v="254" actId="478"/>
+          <ac:spMkLst>
+            <pc:docMk/>
+            <pc:sldMk cId="3861153024" sldId="257"/>
+            <ac:spMk id="25" creationId="{32601903-37E2-461B-8448-41097FD73CE8}"/>
+          </ac:spMkLst>
+        </pc:spChg>
+        <pc:spChg chg="add mod">
+          <ac:chgData name="Mad Scientist" userId="e4c58536287370fd" providerId="LiveId" clId="{8E27B28E-0CA7-4ABF-B227-2DEC33884432}" dt="2020-04-17T13:56:58.323" v="352" actId="14100"/>
+          <ac:spMkLst>
+            <pc:docMk/>
+            <pc:sldMk cId="3861153024" sldId="257"/>
+            <ac:spMk id="26" creationId="{7F1EC8E4-3C43-4F63-8AF7-D4E488BD97AD}"/>
+          </ac:spMkLst>
+        </pc:spChg>
+        <pc:spChg chg="add mod">
+          <ac:chgData name="Mad Scientist" userId="e4c58536287370fd" providerId="LiveId" clId="{8E27B28E-0CA7-4ABF-B227-2DEC33884432}" dt="2020-04-17T13:57:57.792" v="359" actId="1076"/>
+          <ac:spMkLst>
+            <pc:docMk/>
+            <pc:sldMk cId="3861153024" sldId="257"/>
+            <ac:spMk id="27" creationId="{4F4763DB-C8CE-43AA-838F-084140D961F1}"/>
+          </ac:spMkLst>
+        </pc:spChg>
+        <pc:spChg chg="add mod">
+          <ac:chgData name="Mad Scientist" userId="e4c58536287370fd" providerId="LiveId" clId="{8E27B28E-0CA7-4ABF-B227-2DEC33884432}" dt="2020-04-17T14:07:26.382" v="451" actId="14100"/>
+          <ac:spMkLst>
+            <pc:docMk/>
+            <pc:sldMk cId="3861153024" sldId="257"/>
+            <ac:spMk id="28" creationId="{80AA252D-8675-4746-BAB5-EE74FB79AD2A}"/>
+          </ac:spMkLst>
+        </pc:spChg>
+        <pc:spChg chg="add mod">
+          <ac:chgData name="Mad Scientist" userId="e4c58536287370fd" providerId="LiveId" clId="{8E27B28E-0CA7-4ABF-B227-2DEC33884432}" dt="2020-04-17T14:07:10.333" v="450" actId="1076"/>
+          <ac:spMkLst>
+            <pc:docMk/>
+            <pc:sldMk cId="3861153024" sldId="257"/>
+            <ac:spMk id="29" creationId="{98D1505D-626E-4CD7-8F78-C45BB4D404B1}"/>
+          </ac:spMkLst>
+        </pc:spChg>
+        <pc:spChg chg="add mod">
+          <ac:chgData name="Mad Scientist" userId="e4c58536287370fd" providerId="LiveId" clId="{8E27B28E-0CA7-4ABF-B227-2DEC33884432}" dt="2020-04-17T14:07:10.333" v="450" actId="1076"/>
+          <ac:spMkLst>
+            <pc:docMk/>
+            <pc:sldMk cId="3861153024" sldId="257"/>
+            <ac:spMk id="30" creationId="{A6019AD9-796E-4C81-A949-EA8E6F90CE46}"/>
+          </ac:spMkLst>
+        </pc:spChg>
+        <pc:cxnChg chg="add mod">
+          <ac:chgData name="Mad Scientist" userId="e4c58536287370fd" providerId="LiveId" clId="{8E27B28E-0CA7-4ABF-B227-2DEC33884432}" dt="2020-04-17T14:07:10.333" v="450" actId="1076"/>
+          <ac:cxnSpMkLst>
+            <pc:docMk/>
+            <pc:sldMk cId="3861153024" sldId="257"/>
+            <ac:cxnSpMk id="32" creationId="{1F301E2E-8521-4AFC-84A4-FC60EAB2C3B4}"/>
+          </ac:cxnSpMkLst>
+        </pc:cxnChg>
+      </pc:sldChg>
+      <pc:sldChg chg="add del">
+        <pc:chgData name="Mad Scientist" userId="e4c58536287370fd" providerId="LiveId" clId="{8E27B28E-0CA7-4ABF-B227-2DEC33884432}" dt="2020-04-17T13:29:58.044" v="61" actId="2696"/>
+        <pc:sldMkLst>
+          <pc:docMk/>
+          <pc:sldMk cId="670334458" sldId="258"/>
+        </pc:sldMkLst>
+      </pc:sldChg>
+      <pc:sldChg chg="modSp add del setBg">
+        <pc:chgData name="Mad Scientist" userId="e4c58536287370fd" providerId="LiveId" clId="{8E27B28E-0CA7-4ABF-B227-2DEC33884432}" dt="2020-04-17T13:28:52.038" v="56" actId="2696"/>
+        <pc:sldMkLst>
+          <pc:docMk/>
+          <pc:sldMk cId="3344352826" sldId="258"/>
+        </pc:sldMkLst>
+        <pc:spChg chg="mod">
+          <ac:chgData name="Mad Scientist" userId="e4c58536287370fd" providerId="LiveId" clId="{8E27B28E-0CA7-4ABF-B227-2DEC33884432}" dt="2020-04-17T13:26:11.765" v="48" actId="207"/>
+          <ac:spMkLst>
+            <pc:docMk/>
+            <pc:sldMk cId="3344352826" sldId="258"/>
+            <ac:spMk id="7" creationId="{352CBB90-B6E1-43EC-ACB3-1FDF3F240841}"/>
+          </ac:spMkLst>
+        </pc:spChg>
+      </pc:sldChg>
+      <pc:sldChg chg="delSp add">
+        <pc:chgData name="Mad Scientist" userId="e4c58536287370fd" providerId="LiveId" clId="{8E27B28E-0CA7-4ABF-B227-2DEC33884432}" dt="2020-04-17T13:29:34.177" v="60" actId="478"/>
+        <pc:sldMkLst>
+          <pc:docMk/>
+          <pc:sldMk cId="3277436353" sldId="259"/>
+        </pc:sldMkLst>
+        <pc:spChg chg="del">
+          <ac:chgData name="Mad Scientist" userId="e4c58536287370fd" providerId="LiveId" clId="{8E27B28E-0CA7-4ABF-B227-2DEC33884432}" dt="2020-04-17T13:29:19.793" v="59" actId="478"/>
+          <ac:spMkLst>
+            <pc:docMk/>
+            <pc:sldMk cId="3277436353" sldId="259"/>
+            <ac:spMk id="7" creationId="{352CBB90-B6E1-43EC-ACB3-1FDF3F240841}"/>
+          </ac:spMkLst>
+        </pc:spChg>
+        <pc:spChg chg="del">
+          <ac:chgData name="Mad Scientist" userId="e4c58536287370fd" providerId="LiveId" clId="{8E27B28E-0CA7-4ABF-B227-2DEC33884432}" dt="2020-04-17T13:29:34.177" v="60" actId="478"/>
+          <ac:spMkLst>
+            <pc:docMk/>
+            <pc:sldMk cId="3277436353" sldId="259"/>
+            <ac:spMk id="12" creationId="{29381AB7-125A-4251-A8C8-11EBE6B95637}"/>
+          </ac:spMkLst>
+        </pc:spChg>
+      </pc:sldChg>
+      <pc:sldChg chg="add">
+        <pc:chgData name="Mad Scientist" userId="e4c58536287370fd" providerId="LiveId" clId="{8E27B28E-0CA7-4ABF-B227-2DEC33884432}" dt="2020-04-17T13:38:21.199" v="86"/>
+        <pc:sldMkLst>
+          <pc:docMk/>
+          <pc:sldMk cId="74157496" sldId="260"/>
+        </pc:sldMkLst>
+      </pc:sldChg>
+    </pc:docChg>
+  </pc:docChgLst>
+</pc:chgInfo>
+</file>
+
+<file path=ppt/comments/comment1.xml><?xml version="1.0" encoding="utf-8"?>
+<p:cmLst xmlns:a="http://schemas.openxmlformats.org/drawingml/2006/main" xmlns:r="http://schemas.openxmlformats.org/officeDocument/2006/relationships" xmlns:p="http://schemas.openxmlformats.org/presentationml/2006/main">
+  <p:cm authorId="1" dt="2020-04-17T06:30:14.107" idx="1">
+    <p:pos x="10" y="10"/>
+    <p:text>The landing page is going to be more general. Alowing future users to easily navigate to other AI offerings from fhrhdai.com.</p:text>
+    <p:extLst>
+      <p:ext uri="{C676402C-5697-4E1C-873F-D02D1690AC5C}">
+        <p15:threadingInfo xmlns:p15="http://schemas.microsoft.com/office/powerpoint/2012/main" timeZoneBias="420"/>
+      </p:ext>
+    </p:extLst>
+  </p:cm>
+</p:cmLst>
 </file>
 
 <file path=ppt/slideLayouts/slideLayout1.xml><?xml version="1.0" encoding="utf-8"?>
@@ -1474,6 +1837,788 @@
     <p:extLst>
       <p:ext uri="{BB962C8B-B14F-4D97-AF65-F5344CB8AC3E}">
         <p14:creationId xmlns:p14="http://schemas.microsoft.com/office/powerpoint/2010/main" val="654728629"/>
+      </p:ext>
+    </p:extLst>
+  </p:cSld>
+  <p:clrMapOvr>
+    <a:masterClrMapping/>
+  </p:clrMapOvr>
+</p:sld>
+</file>
+
+<file path=ppt/slides/slide2.xml><?xml version="1.0" encoding="utf-8"?>
+<p:sld xmlns:a="http://schemas.openxmlformats.org/drawingml/2006/main" xmlns:r="http://schemas.openxmlformats.org/officeDocument/2006/relationships" xmlns:p="http://schemas.openxmlformats.org/presentationml/2006/main">
+  <p:cSld>
+    <p:bg>
+      <p:bgPr>
+        <a:blipFill rotWithShape="1">
+          <a:blip r:embed="rId2">
+            <a:lum bright="70000" contrast="-70000"/>
+            <a:extLst>
+              <a:ext uri="{BEBA8EAE-BF5A-486C-A8C5-ECC9F3942E4B}">
+                <a14:imgProps xmlns:a14="http://schemas.microsoft.com/office/drawing/2010/main">
+                  <a14:imgLayer r:embed="rId3">
+                    <a14:imgEffect>
+                      <a14:colorTemperature colorTemp="4700"/>
+                    </a14:imgEffect>
+                    <a14:imgEffect>
+                      <a14:saturation sat="178000"/>
+                    </a14:imgEffect>
+                  </a14:imgLayer>
+                </a14:imgProps>
+              </a:ext>
+            </a:extLst>
+          </a:blip>
+          <a:stretch/>
+        </a:blipFill>
+        <a:effectLst/>
+      </p:bgPr>
+    </p:bg>
+    <p:spTree>
+      <p:nvGrpSpPr>
+        <p:cNvPr id="1" name=""/>
+        <p:cNvGrpSpPr/>
+        <p:nvPr/>
+      </p:nvGrpSpPr>
+      <p:grpSpPr>
+        <a:xfrm>
+          <a:off x="0" y="0"/>
+          <a:ext cx="0" cy="0"/>
+          <a:chOff x="0" y="0"/>
+          <a:chExt cx="0" cy="0"/>
+        </a:xfrm>
+      </p:grpSpPr>
+      <p:sp>
+        <p:nvSpPr>
+          <p:cNvPr id="12" name="TextBox 11">
+            <a:extLst>
+              <a:ext uri="{FF2B5EF4-FFF2-40B4-BE49-F238E27FC236}">
+                <a16:creationId xmlns:a16="http://schemas.microsoft.com/office/drawing/2014/main" id="{29381AB7-125A-4251-A8C8-11EBE6B95637}"/>
+              </a:ext>
+            </a:extLst>
+          </p:cNvPr>
+          <p:cNvSpPr txBox="1"/>
+          <p:nvPr/>
+        </p:nvSpPr>
+        <p:spPr>
+          <a:xfrm>
+            <a:off x="1" y="0"/>
+            <a:ext cx="12192000" cy="429208"/>
+          </a:xfrm>
+          <a:prstGeom prst="rect">
+            <a:avLst/>
+          </a:prstGeom>
+          <a:solidFill>
+            <a:schemeClr val="bg2">
+              <a:lumMod val="10000"/>
+              <a:lumOff val="90000"/>
+            </a:schemeClr>
+          </a:solidFill>
+        </p:spPr>
+        <p:txBody>
+          <a:bodyPr wrap="square" rtlCol="0">
+            <a:spAutoFit/>
+          </a:bodyPr>
+          <a:lstStyle/>
+          <a:p>
+            <a:endParaRPr lang="en-US" dirty="0"/>
+          </a:p>
+        </p:txBody>
+      </p:sp>
+      <p:sp>
+        <p:nvSpPr>
+          <p:cNvPr id="13" name="TextBox 12">
+            <a:extLst>
+              <a:ext uri="{FF2B5EF4-FFF2-40B4-BE49-F238E27FC236}">
+                <a16:creationId xmlns:a16="http://schemas.microsoft.com/office/drawing/2014/main" id="{6840699F-79A2-4BEB-AD0D-0178151A40C2}"/>
+              </a:ext>
+            </a:extLst>
+          </p:cNvPr>
+          <p:cNvSpPr txBox="1"/>
+          <p:nvPr/>
+        </p:nvSpPr>
+        <p:spPr>
+          <a:xfrm>
+            <a:off x="494522" y="2090057"/>
+            <a:ext cx="3377682" cy="2136710"/>
+          </a:xfrm>
+          <a:prstGeom prst="rect">
+            <a:avLst/>
+          </a:prstGeom>
+          <a:solidFill>
+            <a:srgbClr val="7030A0"/>
+          </a:solidFill>
+        </p:spPr>
+        <p:txBody>
+          <a:bodyPr wrap="square" rtlCol="0">
+            <a:spAutoFit/>
+          </a:bodyPr>
+          <a:lstStyle/>
+          <a:p>
+            <a:endParaRPr lang="en-US" dirty="0"/>
+          </a:p>
+        </p:txBody>
+      </p:sp>
+      <p:sp>
+        <p:nvSpPr>
+          <p:cNvPr id="14" name="TextBox 13">
+            <a:extLst>
+              <a:ext uri="{FF2B5EF4-FFF2-40B4-BE49-F238E27FC236}">
+                <a16:creationId xmlns:a16="http://schemas.microsoft.com/office/drawing/2014/main" id="{8817FE8E-E295-4E31-80CF-FD1A325C1D31}"/>
+              </a:ext>
+            </a:extLst>
+          </p:cNvPr>
+          <p:cNvSpPr txBox="1"/>
+          <p:nvPr/>
+        </p:nvSpPr>
+        <p:spPr>
+          <a:xfrm>
+            <a:off x="4407159" y="2090057"/>
+            <a:ext cx="3377682" cy="2136710"/>
+          </a:xfrm>
+          <a:prstGeom prst="rect">
+            <a:avLst/>
+          </a:prstGeom>
+          <a:solidFill>
+            <a:srgbClr val="7030A0"/>
+          </a:solidFill>
+        </p:spPr>
+        <p:txBody>
+          <a:bodyPr wrap="square" rtlCol="0">
+            <a:spAutoFit/>
+          </a:bodyPr>
+          <a:lstStyle/>
+          <a:p>
+            <a:endParaRPr lang="en-US" dirty="0"/>
+          </a:p>
+        </p:txBody>
+      </p:sp>
+      <p:sp>
+        <p:nvSpPr>
+          <p:cNvPr id="15" name="TextBox 14">
+            <a:extLst>
+              <a:ext uri="{FF2B5EF4-FFF2-40B4-BE49-F238E27FC236}">
+                <a16:creationId xmlns:a16="http://schemas.microsoft.com/office/drawing/2014/main" id="{0ADE8F13-B377-499F-8E8A-3FB267F67AD7}"/>
+              </a:ext>
+            </a:extLst>
+          </p:cNvPr>
+          <p:cNvSpPr txBox="1"/>
+          <p:nvPr/>
+        </p:nvSpPr>
+        <p:spPr>
+          <a:xfrm>
+            <a:off x="8319796" y="2090057"/>
+            <a:ext cx="3377682" cy="2136710"/>
+          </a:xfrm>
+          <a:prstGeom prst="rect">
+            <a:avLst/>
+          </a:prstGeom>
+          <a:solidFill>
+            <a:srgbClr val="7030A0"/>
+          </a:solidFill>
+        </p:spPr>
+        <p:txBody>
+          <a:bodyPr wrap="square" rtlCol="0">
+            <a:spAutoFit/>
+          </a:bodyPr>
+          <a:lstStyle/>
+          <a:p>
+            <a:endParaRPr lang="en-US" dirty="0"/>
+          </a:p>
+        </p:txBody>
+      </p:sp>
+      <p:sp>
+        <p:nvSpPr>
+          <p:cNvPr id="16" name="TextBox 15">
+            <a:extLst>
+              <a:ext uri="{FF2B5EF4-FFF2-40B4-BE49-F238E27FC236}">
+                <a16:creationId xmlns:a16="http://schemas.microsoft.com/office/drawing/2014/main" id="{5923FE38-DC71-48CA-985B-B27E7852FAE7}"/>
+              </a:ext>
+            </a:extLst>
+          </p:cNvPr>
+          <p:cNvSpPr txBox="1"/>
+          <p:nvPr/>
+        </p:nvSpPr>
+        <p:spPr>
+          <a:xfrm>
+            <a:off x="1119673" y="2883160"/>
+            <a:ext cx="2127380" cy="369332"/>
+          </a:xfrm>
+          <a:prstGeom prst="rect">
+            <a:avLst/>
+          </a:prstGeom>
+          <a:solidFill>
+            <a:schemeClr val="tx1"/>
+          </a:solidFill>
+        </p:spPr>
+        <p:txBody>
+          <a:bodyPr wrap="square" rtlCol="0">
+            <a:spAutoFit/>
+          </a:bodyPr>
+          <a:lstStyle/>
+          <a:p>
+            <a:pPr algn="ctr"/>
+            <a:r>
+              <a:rPr lang="en-US" dirty="0">
+                <a:solidFill>
+                  <a:srgbClr val="002060"/>
+                </a:solidFill>
+              </a:rPr>
+              <a:t>Education</a:t>
+            </a:r>
+          </a:p>
+        </p:txBody>
+      </p:sp>
+      <p:sp>
+        <p:nvSpPr>
+          <p:cNvPr id="17" name="TextBox 16">
+            <a:extLst>
+              <a:ext uri="{FF2B5EF4-FFF2-40B4-BE49-F238E27FC236}">
+                <a16:creationId xmlns:a16="http://schemas.microsoft.com/office/drawing/2014/main" id="{91321A39-79C8-4DC8-AEF7-C9B8EDECD131}"/>
+              </a:ext>
+            </a:extLst>
+          </p:cNvPr>
+          <p:cNvSpPr txBox="1"/>
+          <p:nvPr/>
+        </p:nvSpPr>
+        <p:spPr>
+          <a:xfrm>
+            <a:off x="494522" y="3778898"/>
+            <a:ext cx="3377681" cy="400110"/>
+          </a:xfrm>
+          <a:prstGeom prst="rect">
+            <a:avLst/>
+          </a:prstGeom>
+          <a:solidFill>
+            <a:schemeClr val="tx1"/>
+          </a:solidFill>
+        </p:spPr>
+        <p:txBody>
+          <a:bodyPr wrap="square" rtlCol="0">
+            <a:spAutoFit/>
+          </a:bodyPr>
+          <a:lstStyle/>
+          <a:p>
+            <a:pPr algn="ctr"/>
+            <a:r>
+              <a:rPr lang="en-US" sz="1000" dirty="0">
+                <a:solidFill>
+                  <a:srgbClr val="002060"/>
+                </a:solidFill>
+              </a:rPr>
+              <a:t>With the help of artificial intelligence learn anything, then teach your AI what you know</a:t>
+            </a:r>
+          </a:p>
+        </p:txBody>
+      </p:sp>
+      <p:sp>
+        <p:nvSpPr>
+          <p:cNvPr id="21" name="TextBox 20">
+            <a:extLst>
+              <a:ext uri="{FF2B5EF4-FFF2-40B4-BE49-F238E27FC236}">
+                <a16:creationId xmlns:a16="http://schemas.microsoft.com/office/drawing/2014/main" id="{0733964E-44B3-44C4-AD40-1768EDB43325}"/>
+              </a:ext>
+            </a:extLst>
+          </p:cNvPr>
+          <p:cNvSpPr txBox="1"/>
+          <p:nvPr/>
+        </p:nvSpPr>
+        <p:spPr>
+          <a:xfrm>
+            <a:off x="494522" y="4584441"/>
+            <a:ext cx="3377682" cy="2136710"/>
+          </a:xfrm>
+          <a:prstGeom prst="rect">
+            <a:avLst/>
+          </a:prstGeom>
+          <a:solidFill>
+            <a:srgbClr val="7030A0"/>
+          </a:solidFill>
+        </p:spPr>
+        <p:txBody>
+          <a:bodyPr wrap="square" rtlCol="0">
+            <a:spAutoFit/>
+          </a:bodyPr>
+          <a:lstStyle/>
+          <a:p>
+            <a:endParaRPr lang="en-US" dirty="0"/>
+          </a:p>
+        </p:txBody>
+      </p:sp>
+      <p:sp>
+        <p:nvSpPr>
+          <p:cNvPr id="22" name="TextBox 21">
+            <a:extLst>
+              <a:ext uri="{FF2B5EF4-FFF2-40B4-BE49-F238E27FC236}">
+                <a16:creationId xmlns:a16="http://schemas.microsoft.com/office/drawing/2014/main" id="{051A1F26-830D-4B05-A7E0-59CBB3C82E74}"/>
+              </a:ext>
+            </a:extLst>
+          </p:cNvPr>
+          <p:cNvSpPr txBox="1"/>
+          <p:nvPr/>
+        </p:nvSpPr>
+        <p:spPr>
+          <a:xfrm>
+            <a:off x="4592214" y="4584441"/>
+            <a:ext cx="3377682" cy="2136710"/>
+          </a:xfrm>
+          <a:prstGeom prst="rect">
+            <a:avLst/>
+          </a:prstGeom>
+          <a:solidFill>
+            <a:srgbClr val="7030A0"/>
+          </a:solidFill>
+        </p:spPr>
+        <p:txBody>
+          <a:bodyPr wrap="square" rtlCol="0">
+            <a:spAutoFit/>
+          </a:bodyPr>
+          <a:lstStyle/>
+          <a:p>
+            <a:endParaRPr lang="en-US" dirty="0"/>
+          </a:p>
+        </p:txBody>
+      </p:sp>
+      <p:sp>
+        <p:nvSpPr>
+          <p:cNvPr id="23" name="TextBox 22">
+            <a:extLst>
+              <a:ext uri="{FF2B5EF4-FFF2-40B4-BE49-F238E27FC236}">
+                <a16:creationId xmlns:a16="http://schemas.microsoft.com/office/drawing/2014/main" id="{2BF92073-F8C6-4DD7-8744-5EC725E766DB}"/>
+              </a:ext>
+            </a:extLst>
+          </p:cNvPr>
+          <p:cNvSpPr txBox="1"/>
+          <p:nvPr/>
+        </p:nvSpPr>
+        <p:spPr>
+          <a:xfrm>
+            <a:off x="8319796" y="4584441"/>
+            <a:ext cx="3377682" cy="2136710"/>
+          </a:xfrm>
+          <a:prstGeom prst="rect">
+            <a:avLst/>
+          </a:prstGeom>
+          <a:solidFill>
+            <a:srgbClr val="7030A0"/>
+          </a:solidFill>
+        </p:spPr>
+        <p:txBody>
+          <a:bodyPr wrap="square" rtlCol="0">
+            <a:spAutoFit/>
+          </a:bodyPr>
+          <a:lstStyle/>
+          <a:p>
+            <a:endParaRPr lang="en-US" dirty="0"/>
+          </a:p>
+        </p:txBody>
+      </p:sp>
+      <p:sp>
+        <p:nvSpPr>
+          <p:cNvPr id="26" name="TextBox 25">
+            <a:extLst>
+              <a:ext uri="{FF2B5EF4-FFF2-40B4-BE49-F238E27FC236}">
+                <a16:creationId xmlns:a16="http://schemas.microsoft.com/office/drawing/2014/main" id="{7F1EC8E4-3C43-4F63-8AF7-D4E488BD97AD}"/>
+              </a:ext>
+            </a:extLst>
+          </p:cNvPr>
+          <p:cNvSpPr txBox="1"/>
+          <p:nvPr/>
+        </p:nvSpPr>
+        <p:spPr>
+          <a:xfrm>
+            <a:off x="10795518" y="0"/>
+            <a:ext cx="1396481" cy="523220"/>
+          </a:xfrm>
+          <a:prstGeom prst="rect">
+            <a:avLst/>
+          </a:prstGeom>
+          <a:solidFill>
+            <a:schemeClr val="tx1"/>
+          </a:solidFill>
+          <a:ln w="19050">
+            <a:solidFill>
+              <a:srgbClr val="7030A0"/>
+            </a:solidFill>
+          </a:ln>
+        </p:spPr>
+        <p:txBody>
+          <a:bodyPr wrap="square" rtlCol="0">
+            <a:spAutoFit/>
+          </a:bodyPr>
+          <a:lstStyle/>
+          <a:p>
+            <a:r>
+              <a:rPr lang="en-US" sz="1400" dirty="0">
+                <a:solidFill>
+                  <a:srgbClr val="002060"/>
+                </a:solidFill>
+              </a:rPr>
+              <a:t>Profile Picture and other info</a:t>
+            </a:r>
+          </a:p>
+        </p:txBody>
+      </p:sp>
+      <p:sp>
+        <p:nvSpPr>
+          <p:cNvPr id="27" name="TextBox 26">
+            <a:extLst>
+              <a:ext uri="{FF2B5EF4-FFF2-40B4-BE49-F238E27FC236}">
+                <a16:creationId xmlns:a16="http://schemas.microsoft.com/office/drawing/2014/main" id="{4F4763DB-C8CE-43AA-838F-084140D961F1}"/>
+              </a:ext>
+            </a:extLst>
+          </p:cNvPr>
+          <p:cNvSpPr txBox="1"/>
+          <p:nvPr/>
+        </p:nvSpPr>
+        <p:spPr>
+          <a:xfrm>
+            <a:off x="0" y="0"/>
+            <a:ext cx="877078" cy="523220"/>
+          </a:xfrm>
+          <a:prstGeom prst="rect">
+            <a:avLst/>
+          </a:prstGeom>
+          <a:solidFill>
+            <a:schemeClr val="tx1"/>
+          </a:solidFill>
+          <a:ln w="19050">
+            <a:solidFill>
+              <a:srgbClr val="7030A0"/>
+            </a:solidFill>
+          </a:ln>
+        </p:spPr>
+        <p:txBody>
+          <a:bodyPr wrap="square" rtlCol="0">
+            <a:spAutoFit/>
+          </a:bodyPr>
+          <a:lstStyle/>
+          <a:p>
+            <a:r>
+              <a:rPr lang="en-US" sz="1400" dirty="0" err="1">
+                <a:solidFill>
+                  <a:srgbClr val="002060"/>
+                </a:solidFill>
+              </a:rPr>
+              <a:t>fhrhdai</a:t>
+            </a:r>
+            <a:endParaRPr lang="en-US" sz="1400" dirty="0">
+              <a:solidFill>
+                <a:srgbClr val="002060"/>
+              </a:solidFill>
+            </a:endParaRPr>
+          </a:p>
+          <a:p>
+            <a:r>
+              <a:rPr lang="en-US" sz="1400" dirty="0">
+                <a:solidFill>
+                  <a:srgbClr val="002060"/>
+                </a:solidFill>
+              </a:rPr>
+              <a:t>Motto: </a:t>
+            </a:r>
+          </a:p>
+        </p:txBody>
+      </p:sp>
+      <p:sp>
+        <p:nvSpPr>
+          <p:cNvPr id="28" name="TextBox 27">
+            <a:extLst>
+              <a:ext uri="{FF2B5EF4-FFF2-40B4-BE49-F238E27FC236}">
+                <a16:creationId xmlns:a16="http://schemas.microsoft.com/office/drawing/2014/main" id="{80AA252D-8675-4746-BAB5-EE74FB79AD2A}"/>
+              </a:ext>
+            </a:extLst>
+          </p:cNvPr>
+          <p:cNvSpPr txBox="1"/>
+          <p:nvPr/>
+        </p:nvSpPr>
+        <p:spPr>
+          <a:xfrm>
+            <a:off x="5327780" y="42353"/>
+            <a:ext cx="4516017" cy="307777"/>
+          </a:xfrm>
+          <a:prstGeom prst="rect">
+            <a:avLst/>
+          </a:prstGeom>
+          <a:solidFill>
+            <a:schemeClr val="tx1"/>
+          </a:solidFill>
+          <a:ln w="19050">
+            <a:solidFill>
+              <a:srgbClr val="7030A0"/>
+            </a:solidFill>
+          </a:ln>
+        </p:spPr>
+        <p:txBody>
+          <a:bodyPr wrap="square" rtlCol="0">
+            <a:spAutoFit/>
+          </a:bodyPr>
+          <a:lstStyle/>
+          <a:p>
+            <a:r>
+              <a:rPr lang="en-US" sz="1400" dirty="0">
+                <a:solidFill>
+                  <a:srgbClr val="002060"/>
+                </a:solidFill>
+              </a:rPr>
+              <a:t>Let’s help you find what you are looking for</a:t>
+            </a:r>
+          </a:p>
+        </p:txBody>
+      </p:sp>
+      <p:sp>
+        <p:nvSpPr>
+          <p:cNvPr id="29" name="TextBox 28">
+            <a:extLst>
+              <a:ext uri="{FF2B5EF4-FFF2-40B4-BE49-F238E27FC236}">
+                <a16:creationId xmlns:a16="http://schemas.microsoft.com/office/drawing/2014/main" id="{98D1505D-626E-4CD7-8F78-C45BB4D404B1}"/>
+              </a:ext>
+            </a:extLst>
+          </p:cNvPr>
+          <p:cNvSpPr txBox="1"/>
+          <p:nvPr/>
+        </p:nvSpPr>
+        <p:spPr>
+          <a:xfrm>
+            <a:off x="9366811" y="9241"/>
+            <a:ext cx="540645" cy="383350"/>
+          </a:xfrm>
+          <a:prstGeom prst="rect">
+            <a:avLst/>
+          </a:prstGeom>
+          <a:solidFill>
+            <a:srgbClr val="7030A0"/>
+          </a:solidFill>
+          <a:ln w="19050">
+            <a:solidFill>
+              <a:srgbClr val="7030A0"/>
+            </a:solidFill>
+          </a:ln>
+        </p:spPr>
+        <p:txBody>
+          <a:bodyPr wrap="square" rtlCol="0">
+            <a:spAutoFit/>
+          </a:bodyPr>
+          <a:lstStyle/>
+          <a:p>
+            <a:endParaRPr lang="en-US" dirty="0">
+              <a:solidFill>
+                <a:srgbClr val="002060"/>
+              </a:solidFill>
+            </a:endParaRPr>
+          </a:p>
+        </p:txBody>
+      </p:sp>
+      <p:sp>
+        <p:nvSpPr>
+          <p:cNvPr id="30" name="Flowchart: Connector 29">
+            <a:extLst>
+              <a:ext uri="{FF2B5EF4-FFF2-40B4-BE49-F238E27FC236}">
+                <a16:creationId xmlns:a16="http://schemas.microsoft.com/office/drawing/2014/main" id="{A6019AD9-796E-4C81-A949-EA8E6F90CE46}"/>
+              </a:ext>
+            </a:extLst>
+          </p:cNvPr>
+          <p:cNvSpPr/>
+          <p:nvPr/>
+        </p:nvSpPr>
+        <p:spPr>
+          <a:xfrm>
+            <a:off x="9474810" y="42353"/>
+            <a:ext cx="197332" cy="197658"/>
+          </a:xfrm>
+          <a:prstGeom prst="flowChartConnector">
+            <a:avLst/>
+          </a:prstGeom>
+          <a:noFill/>
+          <a:ln>
+            <a:solidFill>
+              <a:schemeClr val="tx1"/>
+            </a:solidFill>
+          </a:ln>
+        </p:spPr>
+        <p:style>
+          <a:lnRef idx="2">
+            <a:schemeClr val="accent1">
+              <a:shade val="50000"/>
+            </a:schemeClr>
+          </a:lnRef>
+          <a:fillRef idx="1">
+            <a:schemeClr val="accent1"/>
+          </a:fillRef>
+          <a:effectRef idx="0">
+            <a:schemeClr val="accent1"/>
+          </a:effectRef>
+          <a:fontRef idx="minor">
+            <a:schemeClr val="lt1"/>
+          </a:fontRef>
+        </p:style>
+        <p:txBody>
+          <a:bodyPr rtlCol="0" anchor="ctr"/>
+          <a:lstStyle/>
+          <a:p>
+            <a:pPr algn="ctr"/>
+            <a:endParaRPr lang="en-US"/>
+          </a:p>
+        </p:txBody>
+      </p:sp>
+      <p:cxnSp>
+        <p:nvCxnSpPr>
+          <p:cNvPr id="32" name="Straight Connector 31">
+            <a:extLst>
+              <a:ext uri="{FF2B5EF4-FFF2-40B4-BE49-F238E27FC236}">
+                <a16:creationId xmlns:a16="http://schemas.microsoft.com/office/drawing/2014/main" id="{1F301E2E-8521-4AFC-84A4-FC60EAB2C3B4}"/>
+              </a:ext>
+            </a:extLst>
+          </p:cNvPr>
+          <p:cNvCxnSpPr>
+            <a:cxnSpLocks/>
+            <a:stCxn id="30" idx="5"/>
+          </p:cNvCxnSpPr>
+          <p:nvPr/>
+        </p:nvCxnSpPr>
+        <p:spPr>
+          <a:xfrm>
+            <a:off x="9643243" y="211065"/>
+            <a:ext cx="146554" cy="105012"/>
+          </a:xfrm>
+          <a:prstGeom prst="line">
+            <a:avLst/>
+          </a:prstGeom>
+          <a:ln w="22225">
+            <a:solidFill>
+              <a:schemeClr val="tx1"/>
+            </a:solidFill>
+          </a:ln>
+        </p:spPr>
+        <p:style>
+          <a:lnRef idx="1">
+            <a:schemeClr val="accent1"/>
+          </a:lnRef>
+          <a:fillRef idx="0">
+            <a:schemeClr val="accent1"/>
+          </a:fillRef>
+          <a:effectRef idx="0">
+            <a:schemeClr val="accent1"/>
+          </a:effectRef>
+          <a:fontRef idx="minor">
+            <a:schemeClr val="tx1"/>
+          </a:fontRef>
+        </p:style>
+      </p:cxnSp>
+    </p:spTree>
+    <p:extLst>
+      <p:ext uri="{BB962C8B-B14F-4D97-AF65-F5344CB8AC3E}">
+        <p14:creationId xmlns:p14="http://schemas.microsoft.com/office/powerpoint/2010/main" val="3861153024"/>
+      </p:ext>
+    </p:extLst>
+  </p:cSld>
+  <p:clrMapOvr>
+    <a:masterClrMapping/>
+  </p:clrMapOvr>
+</p:sld>
+</file>
+
+<file path=ppt/slides/slide3.xml><?xml version="1.0" encoding="utf-8"?>
+<p:sld xmlns:a="http://schemas.openxmlformats.org/drawingml/2006/main" xmlns:r="http://schemas.openxmlformats.org/officeDocument/2006/relationships" xmlns:p="http://schemas.openxmlformats.org/presentationml/2006/main">
+  <p:cSld>
+    <p:bg>
+      <p:bgPr>
+        <a:blipFill rotWithShape="1">
+          <a:blip r:embed="rId2">
+            <a:lum bright="70000" contrast="-70000"/>
+            <a:extLst>
+              <a:ext uri="{BEBA8EAE-BF5A-486C-A8C5-ECC9F3942E4B}">
+                <a14:imgProps xmlns:a14="http://schemas.microsoft.com/office/drawing/2010/main">
+                  <a14:imgLayer r:embed="rId3">
+                    <a14:imgEffect>
+                      <a14:colorTemperature colorTemp="4700"/>
+                    </a14:imgEffect>
+                    <a14:imgEffect>
+                      <a14:saturation sat="178000"/>
+                    </a14:imgEffect>
+                  </a14:imgLayer>
+                </a14:imgProps>
+              </a:ext>
+            </a:extLst>
+          </a:blip>
+          <a:stretch/>
+        </a:blipFill>
+        <a:effectLst/>
+      </p:bgPr>
+    </p:bg>
+    <p:spTree>
+      <p:nvGrpSpPr>
+        <p:cNvPr id="1" name=""/>
+        <p:cNvGrpSpPr/>
+        <p:nvPr/>
+      </p:nvGrpSpPr>
+      <p:grpSpPr>
+        <a:xfrm>
+          <a:off x="0" y="0"/>
+          <a:ext cx="0" cy="0"/>
+          <a:chOff x="0" y="0"/>
+          <a:chExt cx="0" cy="0"/>
+        </a:xfrm>
+      </p:grpSpPr>
+    </p:spTree>
+    <p:extLst>
+      <p:ext uri="{BB962C8B-B14F-4D97-AF65-F5344CB8AC3E}">
+        <p14:creationId xmlns:p14="http://schemas.microsoft.com/office/powerpoint/2010/main" val="3277436353"/>
+      </p:ext>
+    </p:extLst>
+  </p:cSld>
+  <p:clrMapOvr>
+    <a:masterClrMapping/>
+  </p:clrMapOvr>
+</p:sld>
+</file>
+
+<file path=ppt/slides/slide4.xml><?xml version="1.0" encoding="utf-8"?>
+<p:sld xmlns:a="http://schemas.openxmlformats.org/drawingml/2006/main" xmlns:r="http://schemas.openxmlformats.org/officeDocument/2006/relationships" xmlns:p="http://schemas.openxmlformats.org/presentationml/2006/main">
+  <p:cSld>
+    <p:bg>
+      <p:bgPr>
+        <a:blipFill rotWithShape="1">
+          <a:blip r:embed="rId2">
+            <a:lum bright="70000" contrast="-70000"/>
+            <a:extLst>
+              <a:ext uri="{BEBA8EAE-BF5A-486C-A8C5-ECC9F3942E4B}">
+                <a14:imgProps xmlns:a14="http://schemas.microsoft.com/office/drawing/2010/main">
+                  <a14:imgLayer r:embed="rId3">
+                    <a14:imgEffect>
+                      <a14:colorTemperature colorTemp="4700"/>
+                    </a14:imgEffect>
+                    <a14:imgEffect>
+                      <a14:saturation sat="178000"/>
+                    </a14:imgEffect>
+                  </a14:imgLayer>
+                </a14:imgProps>
+              </a:ext>
+            </a:extLst>
+          </a:blip>
+          <a:stretch/>
+        </a:blipFill>
+        <a:effectLst/>
+      </p:bgPr>
+    </p:bg>
+    <p:spTree>
+      <p:nvGrpSpPr>
+        <p:cNvPr id="1" name=""/>
+        <p:cNvGrpSpPr/>
+        <p:nvPr/>
+      </p:nvGrpSpPr>
+      <p:grpSpPr>
+        <a:xfrm>
+          <a:off x="0" y="0"/>
+          <a:ext cx="0" cy="0"/>
+          <a:chOff x="0" y="0"/>
+          <a:chExt cx="0" cy="0"/>
+        </a:xfrm>
+      </p:grpSpPr>
+    </p:spTree>
+    <p:extLst>
+      <p:ext uri="{BB962C8B-B14F-4D97-AF65-F5344CB8AC3E}">
+        <p14:creationId xmlns:p14="http://schemas.microsoft.com/office/powerpoint/2010/main" val="74157496"/>
       </p:ext>
     </p:extLst>
   </p:cSld>

</xml_diff>

<commit_message>
Added tiles to landing page in design file
</commit_message>
<xml_diff>
--- a/fhrhdai.pptx
+++ b/fhrhdai.pptx
@@ -146,7 +146,7 @@
 <file path=ppt/revisionInfo.xml><?xml version="1.0" encoding="utf-8"?>
 <p1510:revInfo xmlns:a="http://schemas.openxmlformats.org/drawingml/2006/main" xmlns:r="http://schemas.openxmlformats.org/officeDocument/2006/relationships" xmlns:p1510="http://schemas.microsoft.com/office/powerpoint/2015/10/main">
   <p1510:revLst>
-    <p1510:client id="{8E27B28E-0CA7-4ABF-B227-2DEC33884432}" v="68" dt="2020-04-17T14:03:19.381"/>
+    <p1510:client id="{8E27B28E-0CA7-4ABF-B227-2DEC33884432}" v="71" dt="2020-04-17T17:33:43.757"/>
   </p1510:revLst>
 </p1510:revInfo>
 </file>
@@ -156,12 +156,12 @@
   <pc:docChgLst>
     <pc:chgData name="Mad Scientist" userId="e4c58536287370fd" providerId="LiveId" clId="{8E27B28E-0CA7-4ABF-B227-2DEC33884432}"/>
     <pc:docChg chg="undo custSel addSld delSld modSld modSection">
-      <pc:chgData name="Mad Scientist" userId="e4c58536287370fd" providerId="LiveId" clId="{8E27B28E-0CA7-4ABF-B227-2DEC33884432}" dt="2020-04-17T14:07:26.382" v="451" actId="14100"/>
+      <pc:chgData name="Mad Scientist" userId="e4c58536287370fd" providerId="LiveId" clId="{8E27B28E-0CA7-4ABF-B227-2DEC33884432}" dt="2020-04-17T17:41:41.776" v="753" actId="1076"/>
       <pc:docMkLst>
         <pc:docMk/>
       </pc:docMkLst>
       <pc:sldChg chg="addSp delSp modSp add setBg addCm modCm">
-        <pc:chgData name="Mad Scientist" userId="e4c58536287370fd" providerId="LiveId" clId="{8E27B28E-0CA7-4ABF-B227-2DEC33884432}" dt="2020-04-17T14:07:26.382" v="451" actId="14100"/>
+        <pc:chgData name="Mad Scientist" userId="e4c58536287370fd" providerId="LiveId" clId="{8E27B28E-0CA7-4ABF-B227-2DEC33884432}" dt="2020-04-17T17:41:41.776" v="753" actId="1076"/>
         <pc:sldMkLst>
           <pc:docMk/>
           <pc:sldMk cId="3861153024" sldId="257"/>
@@ -286,6 +286,14 @@
             <ac:spMk id="17" creationId="{91321A39-79C8-4DC8-AEF7-C9B8EDECD131}"/>
           </ac:spMkLst>
         </pc:spChg>
+        <pc:spChg chg="add mod">
+          <ac:chgData name="Mad Scientist" userId="e4c58536287370fd" providerId="LiveId" clId="{8E27B28E-0CA7-4ABF-B227-2DEC33884432}" dt="2020-04-17T17:25:00.485" v="468" actId="20577"/>
+          <ac:spMkLst>
+            <pc:docMk/>
+            <pc:sldMk cId="3861153024" sldId="257"/>
+            <ac:spMk id="18" creationId="{6DE0FF4E-B388-4934-8C27-850D6104F704}"/>
+          </ac:spMkLst>
+        </pc:spChg>
         <pc:spChg chg="add del mod">
           <ac:chgData name="Mad Scientist" userId="e4c58536287370fd" providerId="LiveId" clId="{8E27B28E-0CA7-4ABF-B227-2DEC33884432}" dt="2020-04-17T13:46:28.470" v="250"/>
           <ac:spMkLst>
@@ -294,6 +302,14 @@
             <ac:spMk id="18" creationId="{97ED1359-A254-49B4-8DBA-3A0CB710BE0F}"/>
           </ac:spMkLst>
         </pc:spChg>
+        <pc:spChg chg="add mod">
+          <ac:chgData name="Mad Scientist" userId="e4c58536287370fd" providerId="LiveId" clId="{8E27B28E-0CA7-4ABF-B227-2DEC33884432}" dt="2020-04-17T17:26:45.441" v="551" actId="20577"/>
+          <ac:spMkLst>
+            <pc:docMk/>
+            <pc:sldMk cId="3861153024" sldId="257"/>
+            <ac:spMk id="19" creationId="{1CB3BB74-0F43-4044-95E4-85B0CBEFE509}"/>
+          </ac:spMkLst>
+        </pc:spChg>
         <pc:spChg chg="add del mod">
           <ac:chgData name="Mad Scientist" userId="e4c58536287370fd" providerId="LiveId" clId="{8E27B28E-0CA7-4ABF-B227-2DEC33884432}" dt="2020-04-17T13:46:28.470" v="250"/>
           <ac:spMkLst>
@@ -311,6 +327,14 @@
           </ac:spMkLst>
         </pc:spChg>
         <pc:spChg chg="add mod">
+          <ac:chgData name="Mad Scientist" userId="e4c58536287370fd" providerId="LiveId" clId="{8E27B28E-0CA7-4ABF-B227-2DEC33884432}" dt="2020-04-17T17:34:09.774" v="561" actId="20577"/>
+          <ac:spMkLst>
+            <pc:docMk/>
+            <pc:sldMk cId="3861153024" sldId="257"/>
+            <ac:spMk id="20" creationId="{D8A4CB16-E2DD-4280-9204-56DA92F8EC82}"/>
+          </ac:spMkLst>
+        </pc:spChg>
+        <pc:spChg chg="add mod">
           <ac:chgData name="Mad Scientist" userId="e4c58536287370fd" providerId="LiveId" clId="{8E27B28E-0CA7-4ABF-B227-2DEC33884432}" dt="2020-04-17T13:46:59.334" v="252" actId="1076"/>
           <ac:spMkLst>
             <pc:docMk/>
@@ -340,6 +364,14 @@
             <pc:docMk/>
             <pc:sldMk cId="3861153024" sldId="257"/>
             <ac:spMk id="24" creationId="{07B76DCC-5A65-474C-9355-7E446248AAB1}"/>
+          </ac:spMkLst>
+        </pc:spChg>
+        <pc:spChg chg="add mod">
+          <ac:chgData name="Mad Scientist" userId="e4c58536287370fd" providerId="LiveId" clId="{8E27B28E-0CA7-4ABF-B227-2DEC33884432}" dt="2020-04-17T17:41:41.776" v="753" actId="1076"/>
+          <ac:spMkLst>
+            <pc:docMk/>
+            <pc:sldMk cId="3861153024" sldId="257"/>
+            <ac:spMk id="24" creationId="{FD17C9B6-933F-4244-B5BE-F2776300DC56}"/>
           </ac:spMkLst>
         </pc:spChg>
         <pc:spChg chg="add del mod">
@@ -2505,6 +2537,174 @@
           </a:fontRef>
         </p:style>
       </p:cxnSp>
+      <p:sp>
+        <p:nvSpPr>
+          <p:cNvPr id="18" name="TextBox 17">
+            <a:extLst>
+              <a:ext uri="{FF2B5EF4-FFF2-40B4-BE49-F238E27FC236}">
+                <a16:creationId xmlns:a16="http://schemas.microsoft.com/office/drawing/2014/main" id="{6DE0FF4E-B388-4934-8C27-850D6104F704}"/>
+              </a:ext>
+            </a:extLst>
+          </p:cNvPr>
+          <p:cNvSpPr txBox="1"/>
+          <p:nvPr/>
+        </p:nvSpPr>
+        <p:spPr>
+          <a:xfrm>
+            <a:off x="5032310" y="2883160"/>
+            <a:ext cx="2127380" cy="369332"/>
+          </a:xfrm>
+          <a:prstGeom prst="rect">
+            <a:avLst/>
+          </a:prstGeom>
+          <a:solidFill>
+            <a:schemeClr val="tx1"/>
+          </a:solidFill>
+        </p:spPr>
+        <p:txBody>
+          <a:bodyPr wrap="square" rtlCol="0">
+            <a:spAutoFit/>
+          </a:bodyPr>
+          <a:lstStyle/>
+          <a:p>
+            <a:pPr algn="ctr"/>
+            <a:r>
+              <a:rPr lang="en-US" dirty="0">
+                <a:solidFill>
+                  <a:srgbClr val="002060"/>
+                </a:solidFill>
+              </a:rPr>
+              <a:t>Public</a:t>
+            </a:r>
+          </a:p>
+        </p:txBody>
+      </p:sp>
+      <p:sp>
+        <p:nvSpPr>
+          <p:cNvPr id="19" name="TextBox 18">
+            <a:extLst>
+              <a:ext uri="{FF2B5EF4-FFF2-40B4-BE49-F238E27FC236}">
+                <a16:creationId xmlns:a16="http://schemas.microsoft.com/office/drawing/2014/main" id="{1CB3BB74-0F43-4044-95E4-85B0CBEFE509}"/>
+              </a:ext>
+            </a:extLst>
+          </p:cNvPr>
+          <p:cNvSpPr txBox="1"/>
+          <p:nvPr/>
+        </p:nvSpPr>
+        <p:spPr>
+          <a:xfrm>
+            <a:off x="4407158" y="3778898"/>
+            <a:ext cx="3377681" cy="400110"/>
+          </a:xfrm>
+          <a:prstGeom prst="rect">
+            <a:avLst/>
+          </a:prstGeom>
+          <a:solidFill>
+            <a:schemeClr val="tx1"/>
+          </a:solidFill>
+        </p:spPr>
+        <p:txBody>
+          <a:bodyPr wrap="square" rtlCol="0">
+            <a:spAutoFit/>
+          </a:bodyPr>
+          <a:lstStyle/>
+          <a:p>
+            <a:pPr algn="ctr"/>
+            <a:r>
+              <a:rPr lang="en-US" sz="1000" dirty="0">
+                <a:solidFill>
+                  <a:srgbClr val="002060"/>
+                </a:solidFill>
+              </a:rPr>
+              <a:t>Create an AI agent, give it a profile, train it, then test how much it learned</a:t>
+            </a:r>
+          </a:p>
+        </p:txBody>
+      </p:sp>
+      <p:sp>
+        <p:nvSpPr>
+          <p:cNvPr id="20" name="TextBox 19">
+            <a:extLst>
+              <a:ext uri="{FF2B5EF4-FFF2-40B4-BE49-F238E27FC236}">
+                <a16:creationId xmlns:a16="http://schemas.microsoft.com/office/drawing/2014/main" id="{D8A4CB16-E2DD-4280-9204-56DA92F8EC82}"/>
+              </a:ext>
+            </a:extLst>
+          </p:cNvPr>
+          <p:cNvSpPr txBox="1"/>
+          <p:nvPr/>
+        </p:nvSpPr>
+        <p:spPr>
+          <a:xfrm>
+            <a:off x="8944949" y="2883160"/>
+            <a:ext cx="2127380" cy="369332"/>
+          </a:xfrm>
+          <a:prstGeom prst="rect">
+            <a:avLst/>
+          </a:prstGeom>
+          <a:solidFill>
+            <a:schemeClr val="tx1"/>
+          </a:solidFill>
+        </p:spPr>
+        <p:txBody>
+          <a:bodyPr wrap="square" rtlCol="0">
+            <a:spAutoFit/>
+          </a:bodyPr>
+          <a:lstStyle/>
+          <a:p>
+            <a:pPr algn="ctr"/>
+            <a:r>
+              <a:rPr lang="en-US" dirty="0">
+                <a:solidFill>
+                  <a:srgbClr val="002060"/>
+                </a:solidFill>
+              </a:rPr>
+              <a:t>Business</a:t>
+            </a:r>
+          </a:p>
+        </p:txBody>
+      </p:sp>
+      <p:sp>
+        <p:nvSpPr>
+          <p:cNvPr id="24" name="TextBox 23">
+            <a:extLst>
+              <a:ext uri="{FF2B5EF4-FFF2-40B4-BE49-F238E27FC236}">
+                <a16:creationId xmlns:a16="http://schemas.microsoft.com/office/drawing/2014/main" id="{FD17C9B6-933F-4244-B5BE-F2776300DC56}"/>
+              </a:ext>
+            </a:extLst>
+          </p:cNvPr>
+          <p:cNvSpPr txBox="1"/>
+          <p:nvPr/>
+        </p:nvSpPr>
+        <p:spPr>
+          <a:xfrm>
+            <a:off x="8319794" y="3625010"/>
+            <a:ext cx="3377681" cy="553998"/>
+          </a:xfrm>
+          <a:prstGeom prst="rect">
+            <a:avLst/>
+          </a:prstGeom>
+          <a:solidFill>
+            <a:schemeClr val="tx1"/>
+          </a:solidFill>
+        </p:spPr>
+        <p:txBody>
+          <a:bodyPr wrap="square" rtlCol="0">
+            <a:spAutoFit/>
+          </a:bodyPr>
+          <a:lstStyle/>
+          <a:p>
+            <a:pPr algn="ctr"/>
+            <a:r>
+              <a:rPr lang="en-US" sz="1000" dirty="0">
+                <a:solidFill>
+                  <a:srgbClr val="002060"/>
+                </a:solidFill>
+              </a:rPr>
+              <a:t>Without any knowledge of programing, create AI agents for various aspects of your business and watch your margins grow while you sleep</a:t>
+            </a:r>
+          </a:p>
+        </p:txBody>
+      </p:sp>
     </p:spTree>
     <p:extLst>
       <p:ext uri="{BB962C8B-B14F-4D97-AF65-F5344CB8AC3E}">

</xml_diff>

<commit_message>
Agriculture and Helth Care tiles added to design file
</commit_message>
<xml_diff>
--- a/fhrhdai.pptx
+++ b/fhrhdai.pptx
@@ -146,7 +146,7 @@
 <file path=ppt/revisionInfo.xml><?xml version="1.0" encoding="utf-8"?>
 <p1510:revInfo xmlns:a="http://schemas.openxmlformats.org/drawingml/2006/main" xmlns:r="http://schemas.openxmlformats.org/officeDocument/2006/relationships" xmlns:p1510="http://schemas.microsoft.com/office/powerpoint/2015/10/main">
   <p1510:revLst>
-    <p1510:client id="{8E27B28E-0CA7-4ABF-B227-2DEC33884432}" v="71" dt="2020-04-17T17:33:43.757"/>
+    <p1510:client id="{8E27B28E-0CA7-4ABF-B227-2DEC33884432}" v="73" dt="2020-04-17T18:30:22.524"/>
   </p1510:revLst>
 </p1510:revInfo>
 </file>
@@ -155,13 +155,13 @@
 <pc:chgInfo xmlns:a="http://schemas.openxmlformats.org/drawingml/2006/main" xmlns:r="http://schemas.openxmlformats.org/officeDocument/2006/relationships" xmlns:ac="http://schemas.microsoft.com/office/drawing/2013/main/command" xmlns:pc="http://schemas.microsoft.com/office/powerpoint/2013/main/command">
   <pc:docChgLst>
     <pc:chgData name="Mad Scientist" userId="e4c58536287370fd" providerId="LiveId" clId="{8E27B28E-0CA7-4ABF-B227-2DEC33884432}"/>
-    <pc:docChg chg="undo custSel addSld delSld modSld modSection">
-      <pc:chgData name="Mad Scientist" userId="e4c58536287370fd" providerId="LiveId" clId="{8E27B28E-0CA7-4ABF-B227-2DEC33884432}" dt="2020-04-17T17:41:41.776" v="753" actId="1076"/>
+    <pc:docChg chg="undo redo custSel addSld delSld modSld modSection">
+      <pc:chgData name="Mad Scientist" userId="e4c58536287370fd" providerId="LiveId" clId="{8E27B28E-0CA7-4ABF-B227-2DEC33884432}" dt="2020-04-17T18:55:14.586" v="797" actId="1076"/>
       <pc:docMkLst>
         <pc:docMk/>
       </pc:docMkLst>
       <pc:sldChg chg="addSp delSp modSp add setBg addCm modCm">
-        <pc:chgData name="Mad Scientist" userId="e4c58536287370fd" providerId="LiveId" clId="{8E27B28E-0CA7-4ABF-B227-2DEC33884432}" dt="2020-04-17T17:41:41.776" v="753" actId="1076"/>
+        <pc:chgData name="Mad Scientist" userId="e4c58536287370fd" providerId="LiveId" clId="{8E27B28E-0CA7-4ABF-B227-2DEC33884432}" dt="2020-04-17T18:55:14.586" v="797" actId="1076"/>
         <pc:sldMkLst>
           <pc:docMk/>
           <pc:sldMk cId="3861153024" sldId="257"/>
@@ -247,7 +247,7 @@
           </ac:spMkLst>
         </pc:spChg>
         <pc:spChg chg="add mod">
-          <ac:chgData name="Mad Scientist" userId="e4c58536287370fd" providerId="LiveId" clId="{8E27B28E-0CA7-4ABF-B227-2DEC33884432}" dt="2020-04-17T13:37:52.333" v="84" actId="1076"/>
+          <ac:chgData name="Mad Scientist" userId="e4c58536287370fd" providerId="LiveId" clId="{8E27B28E-0CA7-4ABF-B227-2DEC33884432}" dt="2020-04-17T18:32:11.303" v="792" actId="1076"/>
           <ac:spMkLst>
             <pc:docMk/>
             <pc:sldMk cId="3861153024" sldId="257"/>
@@ -271,7 +271,7 @@
           </ac:spMkLst>
         </pc:spChg>
         <pc:spChg chg="add mod">
-          <ac:chgData name="Mad Scientist" userId="e4c58536287370fd" providerId="LiveId" clId="{8E27B28E-0CA7-4ABF-B227-2DEC33884432}" dt="2020-04-17T13:39:34.707" v="101" actId="1076"/>
+          <ac:chgData name="Mad Scientist" userId="e4c58536287370fd" providerId="LiveId" clId="{8E27B28E-0CA7-4ABF-B227-2DEC33884432}" dt="2020-04-17T18:31:30.834" v="788" actId="1076"/>
           <ac:spMkLst>
             <pc:docMk/>
             <pc:sldMk cId="3861153024" sldId="257"/>
@@ -287,7 +287,7 @@
           </ac:spMkLst>
         </pc:spChg>
         <pc:spChg chg="add mod">
-          <ac:chgData name="Mad Scientist" userId="e4c58536287370fd" providerId="LiveId" clId="{8E27B28E-0CA7-4ABF-B227-2DEC33884432}" dt="2020-04-17T17:25:00.485" v="468" actId="20577"/>
+          <ac:chgData name="Mad Scientist" userId="e4c58536287370fd" providerId="LiveId" clId="{8E27B28E-0CA7-4ABF-B227-2DEC33884432}" dt="2020-04-17T18:31:40.385" v="789" actId="1076"/>
           <ac:spMkLst>
             <pc:docMk/>
             <pc:sldMk cId="3861153024" sldId="257"/>
@@ -327,7 +327,7 @@
           </ac:spMkLst>
         </pc:spChg>
         <pc:spChg chg="add mod">
-          <ac:chgData name="Mad Scientist" userId="e4c58536287370fd" providerId="LiveId" clId="{8E27B28E-0CA7-4ABF-B227-2DEC33884432}" dt="2020-04-17T17:34:09.774" v="561" actId="20577"/>
+          <ac:chgData name="Mad Scientist" userId="e4c58536287370fd" providerId="LiveId" clId="{8E27B28E-0CA7-4ABF-B227-2DEC33884432}" dt="2020-04-17T18:32:18.985" v="794" actId="1076"/>
           <ac:spMkLst>
             <pc:docMk/>
             <pc:sldMk cId="3861153024" sldId="257"/>
@@ -343,7 +343,7 @@
           </ac:spMkLst>
         </pc:spChg>
         <pc:spChg chg="add mod">
-          <ac:chgData name="Mad Scientist" userId="e4c58536287370fd" providerId="LiveId" clId="{8E27B28E-0CA7-4ABF-B227-2DEC33884432}" dt="2020-04-17T14:06:42.389" v="449" actId="1076"/>
+          <ac:chgData name="Mad Scientist" userId="e4c58536287370fd" providerId="LiveId" clId="{8E27B28E-0CA7-4ABF-B227-2DEC33884432}" dt="2020-04-17T18:55:14.586" v="797" actId="1076"/>
           <ac:spMkLst>
             <pc:docMk/>
             <pc:sldMk cId="3861153024" sldId="257"/>
@@ -374,6 +374,14 @@
             <ac:spMk id="24" creationId="{FD17C9B6-933F-4244-B5BE-F2776300DC56}"/>
           </ac:spMkLst>
         </pc:spChg>
+        <pc:spChg chg="add mod">
+          <ac:chgData name="Mad Scientist" userId="e4c58536287370fd" providerId="LiveId" clId="{8E27B28E-0CA7-4ABF-B227-2DEC33884432}" dt="2020-04-17T18:31:24.034" v="787" actId="1076"/>
+          <ac:spMkLst>
+            <pc:docMk/>
+            <pc:sldMk cId="3861153024" sldId="257"/>
+            <ac:spMk id="25" creationId="{2FBF0C7F-8D2D-4FE7-BCEC-9B390CE24FD1}"/>
+          </ac:spMkLst>
+        </pc:spChg>
         <pc:spChg chg="add del mod">
           <ac:chgData name="Mad Scientist" userId="e4c58536287370fd" providerId="LiveId" clId="{8E27B28E-0CA7-4ABF-B227-2DEC33884432}" dt="2020-04-17T13:48:50.101" v="254" actId="478"/>
           <ac:spMkLst>
@@ -420,6 +428,30 @@
             <pc:docMk/>
             <pc:sldMk cId="3861153024" sldId="257"/>
             <ac:spMk id="30" creationId="{A6019AD9-796E-4C81-A949-EA8E6F90CE46}"/>
+          </ac:spMkLst>
+        </pc:spChg>
+        <pc:spChg chg="add mod">
+          <ac:chgData name="Mad Scientist" userId="e4c58536287370fd" providerId="LiveId" clId="{8E27B28E-0CA7-4ABF-B227-2DEC33884432}" dt="2020-04-17T18:32:44.023" v="795" actId="20577"/>
+          <ac:spMkLst>
+            <pc:docMk/>
+            <pc:sldMk cId="3861153024" sldId="257"/>
+            <ac:spMk id="31" creationId="{CA023C84-250F-43F9-B6D8-2D6228BC8382}"/>
+          </ac:spMkLst>
+        </pc:spChg>
+        <pc:spChg chg="add mod">
+          <ac:chgData name="Mad Scientist" userId="e4c58536287370fd" providerId="LiveId" clId="{8E27B28E-0CA7-4ABF-B227-2DEC33884432}" dt="2020-04-17T18:55:14.586" v="797" actId="1076"/>
+          <ac:spMkLst>
+            <pc:docMk/>
+            <pc:sldMk cId="3861153024" sldId="257"/>
+            <ac:spMk id="33" creationId="{6CE7E496-AF6D-4B56-B656-C7D05E632548}"/>
+          </ac:spMkLst>
+        </pc:spChg>
+        <pc:spChg chg="add mod">
+          <ac:chgData name="Mad Scientist" userId="e4c58536287370fd" providerId="LiveId" clId="{8E27B28E-0CA7-4ABF-B227-2DEC33884432}" dt="2020-04-17T18:55:14.586" v="797" actId="1076"/>
+          <ac:spMkLst>
+            <pc:docMk/>
+            <pc:sldMk cId="3861153024" sldId="257"/>
+            <ac:spMk id="34" creationId="{4A345C45-6E21-4F4D-8DF9-C73DCC121082}"/>
           </ac:spMkLst>
         </pc:spChg>
         <pc:cxnChg chg="add mod">
@@ -2073,7 +2105,7 @@
         </p:nvSpPr>
         <p:spPr>
           <a:xfrm>
-            <a:off x="1119673" y="2883160"/>
+            <a:off x="1119666" y="2674583"/>
             <a:ext cx="2127380" cy="369332"/>
           </a:xfrm>
           <a:prstGeom prst="rect">
@@ -2191,7 +2223,7 @@
         </p:nvSpPr>
         <p:spPr>
           <a:xfrm>
-            <a:off x="4592214" y="4584441"/>
+            <a:off x="4407159" y="4584441"/>
             <a:ext cx="3377682" cy="2136710"/>
           </a:xfrm>
           <a:prstGeom prst="rect">
@@ -2551,7 +2583,7 @@
         </p:nvSpPr>
         <p:spPr>
           <a:xfrm>
-            <a:off x="5032310" y="2883160"/>
+            <a:off x="5032308" y="2695841"/>
             <a:ext cx="2127380" cy="369332"/>
           </a:xfrm>
           <a:prstGeom prst="rect">
@@ -2635,7 +2667,7 @@
         </p:nvSpPr>
         <p:spPr>
           <a:xfrm>
-            <a:off x="8944949" y="2883160"/>
+            <a:off x="8944954" y="2706777"/>
             <a:ext cx="2127380" cy="369332"/>
           </a:xfrm>
           <a:prstGeom prst="rect">
@@ -2702,6 +2734,168 @@
               </a:rPr>
               <a:t>Without any knowledge of programing, create AI agents for various aspects of your business and watch your margins grow while you sleep</a:t>
             </a:r>
+          </a:p>
+        </p:txBody>
+      </p:sp>
+      <p:sp>
+        <p:nvSpPr>
+          <p:cNvPr id="25" name="TextBox 24">
+            <a:extLst>
+              <a:ext uri="{FF2B5EF4-FFF2-40B4-BE49-F238E27FC236}">
+                <a16:creationId xmlns:a16="http://schemas.microsoft.com/office/drawing/2014/main" id="{2FBF0C7F-8D2D-4FE7-BCEC-9B390CE24FD1}"/>
+              </a:ext>
+            </a:extLst>
+          </p:cNvPr>
+          <p:cNvSpPr txBox="1"/>
+          <p:nvPr/>
+        </p:nvSpPr>
+        <p:spPr>
+          <a:xfrm>
+            <a:off x="1119666" y="5163512"/>
+            <a:ext cx="2127380" cy="369332"/>
+          </a:xfrm>
+          <a:prstGeom prst="rect">
+            <a:avLst/>
+          </a:prstGeom>
+          <a:solidFill>
+            <a:schemeClr val="tx1"/>
+          </a:solidFill>
+        </p:spPr>
+        <p:txBody>
+          <a:bodyPr wrap="square" rtlCol="0">
+            <a:spAutoFit/>
+          </a:bodyPr>
+          <a:lstStyle/>
+          <a:p>
+            <a:pPr algn="ctr"/>
+            <a:r>
+              <a:rPr lang="en-US" dirty="0">
+                <a:solidFill>
+                  <a:srgbClr val="002060"/>
+                </a:solidFill>
+              </a:rPr>
+              <a:t>Agriculture</a:t>
+            </a:r>
+          </a:p>
+        </p:txBody>
+      </p:sp>
+      <p:sp>
+        <p:nvSpPr>
+          <p:cNvPr id="31" name="TextBox 30">
+            <a:extLst>
+              <a:ext uri="{FF2B5EF4-FFF2-40B4-BE49-F238E27FC236}">
+                <a16:creationId xmlns:a16="http://schemas.microsoft.com/office/drawing/2014/main" id="{CA023C84-250F-43F9-B6D8-2D6228BC8382}"/>
+              </a:ext>
+            </a:extLst>
+          </p:cNvPr>
+          <p:cNvSpPr txBox="1"/>
+          <p:nvPr/>
+        </p:nvSpPr>
+        <p:spPr>
+          <a:xfrm>
+            <a:off x="494516" y="6116214"/>
+            <a:ext cx="3377681" cy="246221"/>
+          </a:xfrm>
+          <a:prstGeom prst="rect">
+            <a:avLst/>
+          </a:prstGeom>
+          <a:solidFill>
+            <a:schemeClr val="tx1"/>
+          </a:solidFill>
+        </p:spPr>
+        <p:txBody>
+          <a:bodyPr wrap="square" rtlCol="0">
+            <a:spAutoFit/>
+          </a:bodyPr>
+          <a:lstStyle/>
+          <a:p>
+            <a:pPr algn="ctr"/>
+            <a:endParaRPr lang="en-US" sz="1000" dirty="0">
+              <a:solidFill>
+                <a:srgbClr val="002060"/>
+              </a:solidFill>
+            </a:endParaRPr>
+          </a:p>
+        </p:txBody>
+      </p:sp>
+      <p:sp>
+        <p:nvSpPr>
+          <p:cNvPr id="33" name="TextBox 32">
+            <a:extLst>
+              <a:ext uri="{FF2B5EF4-FFF2-40B4-BE49-F238E27FC236}">
+                <a16:creationId xmlns:a16="http://schemas.microsoft.com/office/drawing/2014/main" id="{6CE7E496-AF6D-4B56-B656-C7D05E632548}"/>
+              </a:ext>
+            </a:extLst>
+          </p:cNvPr>
+          <p:cNvSpPr txBox="1"/>
+          <p:nvPr/>
+        </p:nvSpPr>
+        <p:spPr>
+          <a:xfrm>
+            <a:off x="5032304" y="5163512"/>
+            <a:ext cx="2127380" cy="369332"/>
+          </a:xfrm>
+          <a:prstGeom prst="rect">
+            <a:avLst/>
+          </a:prstGeom>
+          <a:solidFill>
+            <a:schemeClr val="tx1"/>
+          </a:solidFill>
+        </p:spPr>
+        <p:txBody>
+          <a:bodyPr wrap="square" rtlCol="0">
+            <a:spAutoFit/>
+          </a:bodyPr>
+          <a:lstStyle/>
+          <a:p>
+            <a:pPr algn="ctr"/>
+            <a:r>
+              <a:rPr lang="en-US" dirty="0">
+                <a:solidFill>
+                  <a:srgbClr val="002060"/>
+                </a:solidFill>
+              </a:rPr>
+              <a:t>Health Care</a:t>
+            </a:r>
+          </a:p>
+        </p:txBody>
+      </p:sp>
+      <p:sp>
+        <p:nvSpPr>
+          <p:cNvPr id="34" name="TextBox 33">
+            <a:extLst>
+              <a:ext uri="{FF2B5EF4-FFF2-40B4-BE49-F238E27FC236}">
+                <a16:creationId xmlns:a16="http://schemas.microsoft.com/office/drawing/2014/main" id="{4A345C45-6E21-4F4D-8DF9-C73DCC121082}"/>
+              </a:ext>
+            </a:extLst>
+          </p:cNvPr>
+          <p:cNvSpPr txBox="1"/>
+          <p:nvPr/>
+        </p:nvSpPr>
+        <p:spPr>
+          <a:xfrm>
+            <a:off x="4407154" y="6111915"/>
+            <a:ext cx="3377681" cy="246221"/>
+          </a:xfrm>
+          <a:prstGeom prst="rect">
+            <a:avLst/>
+          </a:prstGeom>
+          <a:solidFill>
+            <a:schemeClr val="tx1"/>
+          </a:solidFill>
+        </p:spPr>
+        <p:txBody>
+          <a:bodyPr wrap="square" rtlCol="0">
+            <a:spAutoFit/>
+          </a:bodyPr>
+          <a:lstStyle/>
+          <a:p>
+            <a:pPr algn="ctr"/>
+            <a:endParaRPr lang="en-US" sz="1000" dirty="0">
+              <a:solidFill>
+                <a:srgbClr val="002060"/>
+              </a:solidFill>
+            </a:endParaRPr>
           </a:p>
         </p:txBody>
       </p:sp>

</xml_diff>

<commit_message>
added collapsible side panes
</commit_message>
<xml_diff>
--- a/fhrhdai.pptx
+++ b/fhrhdai.pptx
@@ -133,7 +133,7 @@
 
 <file path=ppt/commentAuthors.xml><?xml version="1.0" encoding="utf-8"?>
 <p:cmAuthorLst xmlns:a="http://schemas.openxmlformats.org/drawingml/2006/main" xmlns:r="http://schemas.openxmlformats.org/officeDocument/2006/relationships" xmlns:p="http://schemas.openxmlformats.org/presentationml/2006/main">
-  <p:cmAuthor id="1" name="Mad Scientist" initials="MS" lastIdx="1" clrIdx="0">
+  <p:cmAuthor id="1" name="Mad Scientist" initials="MS" lastIdx="2" clrIdx="0">
     <p:extLst>
       <p:ext uri="{19B8F6BF-5375-455C-9EA6-DF929625EA0E}">
         <p15:presenceInfo xmlns:p15="http://schemas.microsoft.com/office/powerpoint/2012/main" userId="e4c58536287370fd" providerId="Windows Live"/>
@@ -146,7 +146,7 @@
 <file path=ppt/revisionInfo.xml><?xml version="1.0" encoding="utf-8"?>
 <p1510:revInfo xmlns:a="http://schemas.openxmlformats.org/drawingml/2006/main" xmlns:r="http://schemas.openxmlformats.org/officeDocument/2006/relationships" xmlns:p1510="http://schemas.microsoft.com/office/powerpoint/2015/10/main">
   <p1510:revLst>
-    <p1510:client id="{8E27B28E-0CA7-4ABF-B227-2DEC33884432}" v="73" dt="2020-04-17T18:30:22.524"/>
+    <p1510:client id="{8E27B28E-0CA7-4ABF-B227-2DEC33884432}" v="346" dt="2020-04-17T23:46:28.370"/>
   </p1510:revLst>
 </p1510:revInfo>
 </file>
@@ -156,12 +156,12 @@
   <pc:docChgLst>
     <pc:chgData name="Mad Scientist" userId="e4c58536287370fd" providerId="LiveId" clId="{8E27B28E-0CA7-4ABF-B227-2DEC33884432}"/>
     <pc:docChg chg="undo redo custSel addSld delSld modSld modSection">
-      <pc:chgData name="Mad Scientist" userId="e4c58536287370fd" providerId="LiveId" clId="{8E27B28E-0CA7-4ABF-B227-2DEC33884432}" dt="2020-04-17T22:42:58.484" v="801" actId="1076"/>
+      <pc:chgData name="Mad Scientist" userId="e4c58536287370fd" providerId="LiveId" clId="{8E27B28E-0CA7-4ABF-B227-2DEC33884432}" dt="2020-04-17T23:46:28.370" v="1258" actId="207"/>
       <pc:docMkLst>
         <pc:docMk/>
       </pc:docMkLst>
       <pc:sldChg chg="addSp delSp modSp add setBg addCm modCm">
-        <pc:chgData name="Mad Scientist" userId="e4c58536287370fd" providerId="LiveId" clId="{8E27B28E-0CA7-4ABF-B227-2DEC33884432}" dt="2020-04-17T22:42:58.484" v="801" actId="1076"/>
+        <pc:chgData name="Mad Scientist" userId="e4c58536287370fd" providerId="LiveId" clId="{8E27B28E-0CA7-4ABF-B227-2DEC33884432}" dt="2020-04-17T23:46:28.370" v="1258" actId="207"/>
         <pc:sldMkLst>
           <pc:docMk/>
           <pc:sldMk cId="3861153024" sldId="257"/>
@@ -174,6 +174,14 @@
             <ac:spMk id="2" creationId="{9A0B0C7A-5829-4F33-9732-3F08F931622C}"/>
           </ac:spMkLst>
         </pc:spChg>
+        <pc:spChg chg="add mod">
+          <ac:chgData name="Mad Scientist" userId="e4c58536287370fd" providerId="LiveId" clId="{8E27B28E-0CA7-4ABF-B227-2DEC33884432}" dt="2020-04-17T23:18:56.904" v="951" actId="2085"/>
+          <ac:spMkLst>
+            <pc:docMk/>
+            <pc:sldMk cId="3861153024" sldId="257"/>
+            <ac:spMk id="2" creationId="{E6981EE0-B9FD-44CB-BD35-9FB6DB6AAE23}"/>
+          </ac:spMkLst>
+        </pc:spChg>
         <pc:spChg chg="del">
           <ac:chgData name="Mad Scientist" userId="e4c58536287370fd" providerId="LiveId" clId="{8E27B28E-0CA7-4ABF-B227-2DEC33884432}" dt="2020-04-17T13:12:01.906" v="1"/>
           <ac:spMkLst>
@@ -238,56 +246,56 @@
             <ac:spMk id="11" creationId="{7CBEBBEB-A618-4A2A-9BD3-617145111336}"/>
           </ac:spMkLst>
         </pc:spChg>
+        <pc:spChg chg="add mod ord">
+          <ac:chgData name="Mad Scientist" userId="e4c58536287370fd" providerId="LiveId" clId="{8E27B28E-0CA7-4ABF-B227-2DEC33884432}" dt="2020-04-17T23:20:39.792" v="958" actId="1076"/>
+          <ac:spMkLst>
+            <pc:docMk/>
+            <pc:sldMk cId="3861153024" sldId="257"/>
+            <ac:spMk id="12" creationId="{29381AB7-125A-4251-A8C8-11EBE6B95637}"/>
+          </ac:spMkLst>
+        </pc:spChg>
         <pc:spChg chg="add mod">
-          <ac:chgData name="Mad Scientist" userId="e4c58536287370fd" providerId="LiveId" clId="{8E27B28E-0CA7-4ABF-B227-2DEC33884432}" dt="2020-04-17T13:45:55.349" v="246" actId="207"/>
-          <ac:spMkLst>
-            <pc:docMk/>
-            <pc:sldMk cId="3861153024" sldId="257"/>
-            <ac:spMk id="12" creationId="{29381AB7-125A-4251-A8C8-11EBE6B95637}"/>
+          <ac:chgData name="Mad Scientist" userId="e4c58536287370fd" providerId="LiveId" clId="{8E27B28E-0CA7-4ABF-B227-2DEC33884432}" dt="2020-04-17T23:41:21.309" v="1065" actId="1076"/>
+          <ac:spMkLst>
+            <pc:docMk/>
+            <pc:sldMk cId="3861153024" sldId="257"/>
+            <ac:spMk id="13" creationId="{6840699F-79A2-4BEB-AD0D-0178151A40C2}"/>
           </ac:spMkLst>
         </pc:spChg>
         <pc:spChg chg="add mod">
-          <ac:chgData name="Mad Scientist" userId="e4c58536287370fd" providerId="LiveId" clId="{8E27B28E-0CA7-4ABF-B227-2DEC33884432}" dt="2020-04-17T22:42:58.484" v="801" actId="1076"/>
-          <ac:spMkLst>
-            <pc:docMk/>
-            <pc:sldMk cId="3861153024" sldId="257"/>
-            <ac:spMk id="13" creationId="{6840699F-79A2-4BEB-AD0D-0178151A40C2}"/>
+          <ac:chgData name="Mad Scientist" userId="e4c58536287370fd" providerId="LiveId" clId="{8E27B28E-0CA7-4ABF-B227-2DEC33884432}" dt="2020-04-17T23:40:43.527" v="1062" actId="1076"/>
+          <ac:spMkLst>
+            <pc:docMk/>
+            <pc:sldMk cId="3861153024" sldId="257"/>
+            <ac:spMk id="14" creationId="{8817FE8E-E295-4E31-80CF-FD1A325C1D31}"/>
           </ac:spMkLst>
         </pc:spChg>
         <pc:spChg chg="add mod">
-          <ac:chgData name="Mad Scientist" userId="e4c58536287370fd" providerId="LiveId" clId="{8E27B28E-0CA7-4ABF-B227-2DEC33884432}" dt="2020-04-17T22:42:58.484" v="801" actId="1076"/>
-          <ac:spMkLst>
-            <pc:docMk/>
-            <pc:sldMk cId="3861153024" sldId="257"/>
-            <ac:spMk id="14" creationId="{8817FE8E-E295-4E31-80CF-FD1A325C1D31}"/>
+          <ac:chgData name="Mad Scientist" userId="e4c58536287370fd" providerId="LiveId" clId="{8E27B28E-0CA7-4ABF-B227-2DEC33884432}" dt="2020-04-17T23:40:43.527" v="1062" actId="1076"/>
+          <ac:spMkLst>
+            <pc:docMk/>
+            <pc:sldMk cId="3861153024" sldId="257"/>
+            <ac:spMk id="15" creationId="{0ADE8F13-B377-499F-8E8A-3FB267F67AD7}"/>
           </ac:spMkLst>
         </pc:spChg>
         <pc:spChg chg="add mod">
-          <ac:chgData name="Mad Scientist" userId="e4c58536287370fd" providerId="LiveId" clId="{8E27B28E-0CA7-4ABF-B227-2DEC33884432}" dt="2020-04-17T22:42:58.484" v="801" actId="1076"/>
-          <ac:spMkLst>
-            <pc:docMk/>
-            <pc:sldMk cId="3861153024" sldId="257"/>
-            <ac:spMk id="15" creationId="{0ADE8F13-B377-499F-8E8A-3FB267F67AD7}"/>
+          <ac:chgData name="Mad Scientist" userId="e4c58536287370fd" providerId="LiveId" clId="{8E27B28E-0CA7-4ABF-B227-2DEC33884432}" dt="2020-04-17T23:41:21.309" v="1065" actId="1076"/>
+          <ac:spMkLst>
+            <pc:docMk/>
+            <pc:sldMk cId="3861153024" sldId="257"/>
+            <ac:spMk id="16" creationId="{5923FE38-DC71-48CA-985B-B27E7852FAE7}"/>
           </ac:spMkLst>
         </pc:spChg>
         <pc:spChg chg="add mod">
-          <ac:chgData name="Mad Scientist" userId="e4c58536287370fd" providerId="LiveId" clId="{8E27B28E-0CA7-4ABF-B227-2DEC33884432}" dt="2020-04-17T22:42:58.484" v="801" actId="1076"/>
-          <ac:spMkLst>
-            <pc:docMk/>
-            <pc:sldMk cId="3861153024" sldId="257"/>
-            <ac:spMk id="16" creationId="{5923FE38-DC71-48CA-985B-B27E7852FAE7}"/>
+          <ac:chgData name="Mad Scientist" userId="e4c58536287370fd" providerId="LiveId" clId="{8E27B28E-0CA7-4ABF-B227-2DEC33884432}" dt="2020-04-17T23:41:21.309" v="1065" actId="1076"/>
+          <ac:spMkLst>
+            <pc:docMk/>
+            <pc:sldMk cId="3861153024" sldId="257"/>
+            <ac:spMk id="17" creationId="{91321A39-79C8-4DC8-AEF7-C9B8EDECD131}"/>
           </ac:spMkLst>
         </pc:spChg>
         <pc:spChg chg="add mod">
-          <ac:chgData name="Mad Scientist" userId="e4c58536287370fd" providerId="LiveId" clId="{8E27B28E-0CA7-4ABF-B227-2DEC33884432}" dt="2020-04-17T22:42:58.484" v="801" actId="1076"/>
-          <ac:spMkLst>
-            <pc:docMk/>
-            <pc:sldMk cId="3861153024" sldId="257"/>
-            <ac:spMk id="17" creationId="{91321A39-79C8-4DC8-AEF7-C9B8EDECD131}"/>
-          </ac:spMkLst>
-        </pc:spChg>
-        <pc:spChg chg="add mod">
-          <ac:chgData name="Mad Scientist" userId="e4c58536287370fd" providerId="LiveId" clId="{8E27B28E-0CA7-4ABF-B227-2DEC33884432}" dt="2020-04-17T22:42:58.484" v="801" actId="1076"/>
+          <ac:chgData name="Mad Scientist" userId="e4c58536287370fd" providerId="LiveId" clId="{8E27B28E-0CA7-4ABF-B227-2DEC33884432}" dt="2020-04-17T23:40:53.332" v="1063" actId="1076"/>
           <ac:spMkLst>
             <pc:docMk/>
             <pc:sldMk cId="3861153024" sldId="257"/>
@@ -303,7 +311,7 @@
           </ac:spMkLst>
         </pc:spChg>
         <pc:spChg chg="add mod">
-          <ac:chgData name="Mad Scientist" userId="e4c58536287370fd" providerId="LiveId" clId="{8E27B28E-0CA7-4ABF-B227-2DEC33884432}" dt="2020-04-17T22:42:58.484" v="801" actId="1076"/>
+          <ac:chgData name="Mad Scientist" userId="e4c58536287370fd" providerId="LiveId" clId="{8E27B28E-0CA7-4ABF-B227-2DEC33884432}" dt="2020-04-17T23:40:43.527" v="1062" actId="1076"/>
           <ac:spMkLst>
             <pc:docMk/>
             <pc:sldMk cId="3861153024" sldId="257"/>
@@ -327,7 +335,7 @@
           </ac:spMkLst>
         </pc:spChg>
         <pc:spChg chg="add mod">
-          <ac:chgData name="Mad Scientist" userId="e4c58536287370fd" providerId="LiveId" clId="{8E27B28E-0CA7-4ABF-B227-2DEC33884432}" dt="2020-04-17T22:42:58.484" v="801" actId="1076"/>
+          <ac:chgData name="Mad Scientist" userId="e4c58536287370fd" providerId="LiveId" clId="{8E27B28E-0CA7-4ABF-B227-2DEC33884432}" dt="2020-04-17T23:41:06.470" v="1064" actId="1076"/>
           <ac:spMkLst>
             <pc:docMk/>
             <pc:sldMk cId="3861153024" sldId="257"/>
@@ -342,6 +350,14 @@
             <ac:spMk id="21" creationId="{0733964E-44B3-44C4-AD40-1768EDB43325}"/>
           </ac:spMkLst>
         </pc:spChg>
+        <pc:spChg chg="add mod">
+          <ac:chgData name="Mad Scientist" userId="e4c58536287370fd" providerId="LiveId" clId="{8E27B28E-0CA7-4ABF-B227-2DEC33884432}" dt="2020-04-17T23:25:17.927" v="1048" actId="207"/>
+          <ac:spMkLst>
+            <pc:docMk/>
+            <pc:sldMk cId="3861153024" sldId="257"/>
+            <ac:spMk id="21" creationId="{98B50C22-2081-4C55-9626-6EDE30F9C5B9}"/>
+          </ac:spMkLst>
+        </pc:spChg>
         <pc:spChg chg="add del mod">
           <ac:chgData name="Mad Scientist" userId="e4c58536287370fd" providerId="LiveId" clId="{8E27B28E-0CA7-4ABF-B227-2DEC33884432}" dt="2020-04-17T22:42:33.131" v="798" actId="478"/>
           <ac:spMkLst>
@@ -350,6 +366,14 @@
             <ac:spMk id="22" creationId="{051A1F26-830D-4B05-A7E0-59CBB3C82E74}"/>
           </ac:spMkLst>
         </pc:spChg>
+        <pc:spChg chg="add mod">
+          <ac:chgData name="Mad Scientist" userId="e4c58536287370fd" providerId="LiveId" clId="{8E27B28E-0CA7-4ABF-B227-2DEC33884432}" dt="2020-04-17T23:09:40.967" v="930" actId="1076"/>
+          <ac:spMkLst>
+            <pc:docMk/>
+            <pc:sldMk cId="3861153024" sldId="257"/>
+            <ac:spMk id="22" creationId="{10FA5A16-554F-4AEE-AE1A-89F20C1AD550}"/>
+          </ac:spMkLst>
+        </pc:spChg>
         <pc:spChg chg="add del mod">
           <ac:chgData name="Mad Scientist" userId="e4c58536287370fd" providerId="LiveId" clId="{8E27B28E-0CA7-4ABF-B227-2DEC33884432}" dt="2020-04-17T22:42:33.131" v="798" actId="478"/>
           <ac:spMkLst>
@@ -358,6 +382,14 @@
             <ac:spMk id="23" creationId="{2BF92073-F8C6-4DD7-8744-5EC725E766DB}"/>
           </ac:spMkLst>
         </pc:spChg>
+        <pc:spChg chg="add mod">
+          <ac:chgData name="Mad Scientist" userId="e4c58536287370fd" providerId="LiveId" clId="{8E27B28E-0CA7-4ABF-B227-2DEC33884432}" dt="2020-04-17T23:09:40.967" v="930" actId="1076"/>
+          <ac:spMkLst>
+            <pc:docMk/>
+            <pc:sldMk cId="3861153024" sldId="257"/>
+            <ac:spMk id="23" creationId="{92785D63-DB6E-4426-87BE-4D61D763874C}"/>
+          </ac:spMkLst>
+        </pc:spChg>
         <pc:spChg chg="add del mod">
           <ac:chgData name="Mad Scientist" userId="e4c58536287370fd" providerId="LiveId" clId="{8E27B28E-0CA7-4ABF-B227-2DEC33884432}" dt="2020-04-17T13:48:35.061" v="253" actId="478"/>
           <ac:spMkLst>
@@ -367,7 +399,7 @@
           </ac:spMkLst>
         </pc:spChg>
         <pc:spChg chg="add mod">
-          <ac:chgData name="Mad Scientist" userId="e4c58536287370fd" providerId="LiveId" clId="{8E27B28E-0CA7-4ABF-B227-2DEC33884432}" dt="2020-04-17T22:42:58.484" v="801" actId="1076"/>
+          <ac:chgData name="Mad Scientist" userId="e4c58536287370fd" providerId="LiveId" clId="{8E27B28E-0CA7-4ABF-B227-2DEC33884432}" dt="2020-04-17T23:40:43.527" v="1062" actId="1076"/>
           <ac:spMkLst>
             <pc:docMk/>
             <pc:sldMk cId="3861153024" sldId="257"/>
@@ -391,15 +423,23 @@
           </ac:spMkLst>
         </pc:spChg>
         <pc:spChg chg="add mod">
-          <ac:chgData name="Mad Scientist" userId="e4c58536287370fd" providerId="LiveId" clId="{8E27B28E-0CA7-4ABF-B227-2DEC33884432}" dt="2020-04-17T13:56:58.323" v="352" actId="14100"/>
+          <ac:chgData name="Mad Scientist" userId="e4c58536287370fd" providerId="LiveId" clId="{8E27B28E-0CA7-4ABF-B227-2DEC33884432}" dt="2020-04-17T23:09:40.967" v="930" actId="1076"/>
+          <ac:spMkLst>
+            <pc:docMk/>
+            <pc:sldMk cId="3861153024" sldId="257"/>
+            <ac:spMk id="25" creationId="{5F886A37-61CC-447F-84B4-14C249DE160E}"/>
+          </ac:spMkLst>
+        </pc:spChg>
+        <pc:spChg chg="add mod ord">
+          <ac:chgData name="Mad Scientist" userId="e4c58536287370fd" providerId="LiveId" clId="{8E27B28E-0CA7-4ABF-B227-2DEC33884432}" dt="2020-04-17T23:20:33.993" v="956" actId="166"/>
           <ac:spMkLst>
             <pc:docMk/>
             <pc:sldMk cId="3861153024" sldId="257"/>
             <ac:spMk id="26" creationId="{7F1EC8E4-3C43-4F63-8AF7-D4E488BD97AD}"/>
           </ac:spMkLst>
         </pc:spChg>
-        <pc:spChg chg="add mod">
-          <ac:chgData name="Mad Scientist" userId="e4c58536287370fd" providerId="LiveId" clId="{8E27B28E-0CA7-4ABF-B227-2DEC33884432}" dt="2020-04-17T13:57:57.792" v="359" actId="1076"/>
+        <pc:spChg chg="add mod ord">
+          <ac:chgData name="Mad Scientist" userId="e4c58536287370fd" providerId="LiveId" clId="{8E27B28E-0CA7-4ABF-B227-2DEC33884432}" dt="2020-04-17T23:04:06.379" v="895" actId="166"/>
           <ac:spMkLst>
             <pc:docMk/>
             <pc:sldMk cId="3861153024" sldId="257"/>
@@ -454,12 +494,124 @@
             <ac:spMk id="34" creationId="{4A345C45-6E21-4F4D-8DF9-C73DCC121082}"/>
           </ac:spMkLst>
         </pc:spChg>
+        <pc:spChg chg="add mod">
+          <ac:chgData name="Mad Scientist" userId="e4c58536287370fd" providerId="LiveId" clId="{8E27B28E-0CA7-4ABF-B227-2DEC33884432}" dt="2020-04-17T23:25:31.430" v="1053" actId="207"/>
+          <ac:spMkLst>
+            <pc:docMk/>
+            <pc:sldMk cId="3861153024" sldId="257"/>
+            <ac:spMk id="34" creationId="{7BFA6E58-F963-4B03-B4FB-3B328B196738}"/>
+          </ac:spMkLst>
+        </pc:spChg>
+        <pc:spChg chg="add mod">
+          <ac:chgData name="Mad Scientist" userId="e4c58536287370fd" providerId="LiveId" clId="{8E27B28E-0CA7-4ABF-B227-2DEC33884432}" dt="2020-04-17T23:21:14.856" v="961" actId="1076"/>
+          <ac:spMkLst>
+            <pc:docMk/>
+            <pc:sldMk cId="3861153024" sldId="257"/>
+            <ac:spMk id="35" creationId="{4EA450B9-8E7B-4B9D-837F-1417610FE954}"/>
+          </ac:spMkLst>
+        </pc:spChg>
+        <pc:spChg chg="add mod">
+          <ac:chgData name="Mad Scientist" userId="e4c58536287370fd" providerId="LiveId" clId="{8E27B28E-0CA7-4ABF-B227-2DEC33884432}" dt="2020-04-17T23:22:47.374" v="992" actId="207"/>
+          <ac:spMkLst>
+            <pc:docMk/>
+            <pc:sldMk cId="3861153024" sldId="257"/>
+            <ac:spMk id="39" creationId="{B1C2286A-A19E-413C-851F-FA5FB1E2DFBE}"/>
+          </ac:spMkLst>
+        </pc:spChg>
+        <pc:spChg chg="add mod">
+          <ac:chgData name="Mad Scientist" userId="e4c58536287370fd" providerId="LiveId" clId="{8E27B28E-0CA7-4ABF-B227-2DEC33884432}" dt="2020-04-17T23:24:26.352" v="1015" actId="20577"/>
+          <ac:spMkLst>
+            <pc:docMk/>
+            <pc:sldMk cId="3861153024" sldId="257"/>
+            <ac:spMk id="40" creationId="{9E2CCD7A-7CD3-4914-8760-A05E66871A18}"/>
+          </ac:spMkLst>
+        </pc:spChg>
+        <pc:spChg chg="add mod">
+          <ac:chgData name="Mad Scientist" userId="e4c58536287370fd" providerId="LiveId" clId="{8E27B28E-0CA7-4ABF-B227-2DEC33884432}" dt="2020-04-17T23:24:32.368" v="1024" actId="20577"/>
+          <ac:spMkLst>
+            <pc:docMk/>
+            <pc:sldMk cId="3861153024" sldId="257"/>
+            <ac:spMk id="41" creationId="{5544AA18-D84E-4499-8EA2-7944FA4C970C}"/>
+          </ac:spMkLst>
+        </pc:spChg>
+        <pc:spChg chg="add mod">
+          <ac:chgData name="Mad Scientist" userId="e4c58536287370fd" providerId="LiveId" clId="{8E27B28E-0CA7-4ABF-B227-2DEC33884432}" dt="2020-04-17T23:24:40.539" v="1032" actId="20577"/>
+          <ac:spMkLst>
+            <pc:docMk/>
+            <pc:sldMk cId="3861153024" sldId="257"/>
+            <ac:spMk id="42" creationId="{0056335E-EABE-4A6A-9DAB-D5278C6188AB}"/>
+          </ac:spMkLst>
+        </pc:spChg>
+        <pc:spChg chg="add mod">
+          <ac:chgData name="Mad Scientist" userId="e4c58536287370fd" providerId="LiveId" clId="{8E27B28E-0CA7-4ABF-B227-2DEC33884432}" dt="2020-04-17T23:46:17.993" v="1257" actId="207"/>
+          <ac:spMkLst>
+            <pc:docMk/>
+            <pc:sldMk cId="3861153024" sldId="257"/>
+            <ac:spMk id="43" creationId="{B444EAD6-2E80-4B5F-89AF-07294F206A9E}"/>
+          </ac:spMkLst>
+        </pc:spChg>
+        <pc:spChg chg="add mod">
+          <ac:chgData name="Mad Scientist" userId="e4c58536287370fd" providerId="LiveId" clId="{8E27B28E-0CA7-4ABF-B227-2DEC33884432}" dt="2020-04-17T23:46:28.370" v="1258" actId="207"/>
+          <ac:spMkLst>
+            <pc:docMk/>
+            <pc:sldMk cId="3861153024" sldId="257"/>
+            <ac:spMk id="44" creationId="{599D62E3-F61F-4F0F-BA26-F55C7510708D}"/>
+          </ac:spMkLst>
+        </pc:spChg>
+        <pc:cxnChg chg="add mod">
+          <ac:chgData name="Mad Scientist" userId="e4c58536287370fd" providerId="LiveId" clId="{8E27B28E-0CA7-4ABF-B227-2DEC33884432}" dt="2020-04-17T23:18:37.364" v="949" actId="1076"/>
+          <ac:cxnSpMkLst>
+            <pc:docMk/>
+            <pc:sldMk cId="3861153024" sldId="257"/>
+            <ac:cxnSpMk id="4" creationId="{87510F87-C1D3-412A-BF7D-05BC5D2E4718}"/>
+          </ac:cxnSpMkLst>
+        </pc:cxnChg>
+        <pc:cxnChg chg="add mod">
+          <ac:chgData name="Mad Scientist" userId="e4c58536287370fd" providerId="LiveId" clId="{8E27B28E-0CA7-4ABF-B227-2DEC33884432}" dt="2020-04-17T23:18:37.364" v="949" actId="1076"/>
+          <ac:cxnSpMkLst>
+            <pc:docMk/>
+            <pc:sldMk cId="3861153024" sldId="257"/>
+            <ac:cxnSpMk id="31" creationId="{F5AADB65-4123-4D22-8ECF-16783AAC85CB}"/>
+          </ac:cxnSpMkLst>
+        </pc:cxnChg>
         <pc:cxnChg chg="add mod">
           <ac:chgData name="Mad Scientist" userId="e4c58536287370fd" providerId="LiveId" clId="{8E27B28E-0CA7-4ABF-B227-2DEC33884432}" dt="2020-04-17T14:07:10.333" v="450" actId="1076"/>
           <ac:cxnSpMkLst>
             <pc:docMk/>
             <pc:sldMk cId="3861153024" sldId="257"/>
             <ac:cxnSpMk id="32" creationId="{1F301E2E-8521-4AFC-84A4-FC60EAB2C3B4}"/>
+          </ac:cxnSpMkLst>
+        </pc:cxnChg>
+        <pc:cxnChg chg="add mod">
+          <ac:chgData name="Mad Scientist" userId="e4c58536287370fd" providerId="LiveId" clId="{8E27B28E-0CA7-4ABF-B227-2DEC33884432}" dt="2020-04-17T23:18:37.364" v="949" actId="1076"/>
+          <ac:cxnSpMkLst>
+            <pc:docMk/>
+            <pc:sldMk cId="3861153024" sldId="257"/>
+            <ac:cxnSpMk id="33" creationId="{99EF8E86-73AF-4C88-AE4C-902A02EB6334}"/>
+          </ac:cxnSpMkLst>
+        </pc:cxnChg>
+        <pc:cxnChg chg="add mod">
+          <ac:chgData name="Mad Scientist" userId="e4c58536287370fd" providerId="LiveId" clId="{8E27B28E-0CA7-4ABF-B227-2DEC33884432}" dt="2020-04-17T23:21:14.856" v="961" actId="1076"/>
+          <ac:cxnSpMkLst>
+            <pc:docMk/>
+            <pc:sldMk cId="3861153024" sldId="257"/>
+            <ac:cxnSpMk id="36" creationId="{737073CD-E55F-4D0B-AB68-1ED89F2A334A}"/>
+          </ac:cxnSpMkLst>
+        </pc:cxnChg>
+        <pc:cxnChg chg="add mod">
+          <ac:chgData name="Mad Scientist" userId="e4c58536287370fd" providerId="LiveId" clId="{8E27B28E-0CA7-4ABF-B227-2DEC33884432}" dt="2020-04-17T23:21:14.856" v="961" actId="1076"/>
+          <ac:cxnSpMkLst>
+            <pc:docMk/>
+            <pc:sldMk cId="3861153024" sldId="257"/>
+            <ac:cxnSpMk id="37" creationId="{775A6833-6929-4119-A4C9-C06FFD09C297}"/>
+          </ac:cxnSpMkLst>
+        </pc:cxnChg>
+        <pc:cxnChg chg="add mod">
+          <ac:chgData name="Mad Scientist" userId="e4c58536287370fd" providerId="LiveId" clId="{8E27B28E-0CA7-4ABF-B227-2DEC33884432}" dt="2020-04-17T23:21:14.856" v="961" actId="1076"/>
+          <ac:cxnSpMkLst>
+            <pc:docMk/>
+            <pc:sldMk cId="3861153024" sldId="257"/>
+            <ac:cxnSpMk id="38" creationId="{86D35140-A83D-4E7F-8D1E-8E24CE5F69CA}"/>
           </ac:cxnSpMkLst>
         </pc:cxnChg>
       </pc:sldChg>
@@ -525,6 +677,15 @@
   <p:cm authorId="1" dt="2020-04-17T06:30:14.107" idx="1">
     <p:pos x="10" y="10"/>
     <p:text>The landing page is going to be more general. Alowing future users to easily navigate to other AI offerings from fhrhdai.com.</p:text>
+    <p:extLst>
+      <p:ext uri="{C676402C-5697-4E1C-873F-D02D1690AC5C}">
+        <p15:threadingInfo xmlns:p15="http://schemas.microsoft.com/office/powerpoint/2012/main" timeZoneBias="420"/>
+      </p:ext>
+    </p:extLst>
+  </p:cm>
+  <p:cm authorId="1" dt="2020-04-17T16:04:44.847" idx="2">
+    <p:pos x="1353" y="270"/>
+    <p:text>This pane will have in dropdown form the top 10 most common AI agent for each section. The pane should be collapsible</p:text>
     <p:extLst>
       <p:ext uri="{C676402C-5697-4E1C-873F-D02D1690AC5C}">
         <p15:threadingInfo xmlns:p15="http://schemas.microsoft.com/office/powerpoint/2012/main" timeZoneBias="420"/>
@@ -2003,8 +2164,8 @@
         </p:nvSpPr>
         <p:spPr>
           <a:xfrm>
-            <a:off x="4370236" y="1659790"/>
-            <a:ext cx="3377682" cy="2136710"/>
+            <a:off x="4752582" y="2646861"/>
+            <a:ext cx="3185237" cy="1640529"/>
           </a:xfrm>
           <a:prstGeom prst="rect">
             <a:avLst/>
@@ -2037,8 +2198,8 @@
         </p:nvSpPr>
         <p:spPr>
           <a:xfrm>
-            <a:off x="2287598" y="4510225"/>
-            <a:ext cx="3377682" cy="2136710"/>
+            <a:off x="2809582" y="4488323"/>
+            <a:ext cx="3185237" cy="1640529"/>
           </a:xfrm>
           <a:prstGeom prst="rect">
             <a:avLst/>
@@ -2071,8 +2232,8 @@
         </p:nvSpPr>
         <p:spPr>
           <a:xfrm>
-            <a:off x="6200235" y="4510225"/>
-            <a:ext cx="3377682" cy="2136710"/>
+            <a:off x="6722219" y="4488323"/>
+            <a:ext cx="3185237" cy="1640529"/>
           </a:xfrm>
           <a:prstGeom prst="rect">
             <a:avLst/>
@@ -2105,8 +2266,8 @@
         </p:nvSpPr>
         <p:spPr>
           <a:xfrm>
-            <a:off x="4995380" y="2244316"/>
-            <a:ext cx="2127380" cy="369332"/>
+            <a:off x="5342114" y="2997566"/>
+            <a:ext cx="2006172" cy="369332"/>
           </a:xfrm>
           <a:prstGeom prst="rect">
             <a:avLst/>
@@ -2147,8 +2308,8 @@
         </p:nvSpPr>
         <p:spPr>
           <a:xfrm>
-            <a:off x="4370236" y="3348631"/>
-            <a:ext cx="3377681" cy="400110"/>
+            <a:off x="4752583" y="3827391"/>
+            <a:ext cx="3185236" cy="400110"/>
           </a:xfrm>
           <a:prstGeom prst="rect">
             <a:avLst/>
@@ -2171,113 +2332,6 @@
                 </a:solidFill>
               </a:rPr>
               <a:t>With the help of artificial intelligence learn anything, then teach your AI what you know</a:t>
-            </a:r>
-          </a:p>
-        </p:txBody>
-      </p:sp>
-      <p:sp>
-        <p:nvSpPr>
-          <p:cNvPr id="26" name="TextBox 25">
-            <a:extLst>
-              <a:ext uri="{FF2B5EF4-FFF2-40B4-BE49-F238E27FC236}">
-                <a16:creationId xmlns:a16="http://schemas.microsoft.com/office/drawing/2014/main" id="{7F1EC8E4-3C43-4F63-8AF7-D4E488BD97AD}"/>
-              </a:ext>
-            </a:extLst>
-          </p:cNvPr>
-          <p:cNvSpPr txBox="1"/>
-          <p:nvPr/>
-        </p:nvSpPr>
-        <p:spPr>
-          <a:xfrm>
-            <a:off x="10795518" y="0"/>
-            <a:ext cx="1396481" cy="523220"/>
-          </a:xfrm>
-          <a:prstGeom prst="rect">
-            <a:avLst/>
-          </a:prstGeom>
-          <a:solidFill>
-            <a:schemeClr val="tx1"/>
-          </a:solidFill>
-          <a:ln w="19050">
-            <a:solidFill>
-              <a:srgbClr val="7030A0"/>
-            </a:solidFill>
-          </a:ln>
-        </p:spPr>
-        <p:txBody>
-          <a:bodyPr wrap="square" rtlCol="0">
-            <a:spAutoFit/>
-          </a:bodyPr>
-          <a:lstStyle/>
-          <a:p>
-            <a:r>
-              <a:rPr lang="en-US" sz="1400" dirty="0">
-                <a:solidFill>
-                  <a:srgbClr val="002060"/>
-                </a:solidFill>
-              </a:rPr>
-              <a:t>Profile Picture and other info</a:t>
-            </a:r>
-          </a:p>
-        </p:txBody>
-      </p:sp>
-      <p:sp>
-        <p:nvSpPr>
-          <p:cNvPr id="27" name="TextBox 26">
-            <a:extLst>
-              <a:ext uri="{FF2B5EF4-FFF2-40B4-BE49-F238E27FC236}">
-                <a16:creationId xmlns:a16="http://schemas.microsoft.com/office/drawing/2014/main" id="{4F4763DB-C8CE-43AA-838F-084140D961F1}"/>
-              </a:ext>
-            </a:extLst>
-          </p:cNvPr>
-          <p:cNvSpPr txBox="1"/>
-          <p:nvPr/>
-        </p:nvSpPr>
-        <p:spPr>
-          <a:xfrm>
-            <a:off x="0" y="0"/>
-            <a:ext cx="877078" cy="523220"/>
-          </a:xfrm>
-          <a:prstGeom prst="rect">
-            <a:avLst/>
-          </a:prstGeom>
-          <a:solidFill>
-            <a:schemeClr val="tx1"/>
-          </a:solidFill>
-          <a:ln w="19050">
-            <a:solidFill>
-              <a:srgbClr val="7030A0"/>
-            </a:solidFill>
-          </a:ln>
-        </p:spPr>
-        <p:txBody>
-          <a:bodyPr wrap="square" rtlCol="0">
-            <a:spAutoFit/>
-          </a:bodyPr>
-          <a:lstStyle/>
-          <a:p>
-            <a:r>
-              <a:rPr lang="en-US" sz="1400" dirty="0" err="1">
-                <a:solidFill>
-                  <a:srgbClr val="002060"/>
-                </a:solidFill>
-              </a:rPr>
-              <a:t>fhrhdai</a:t>
-            </a:r>
-            <a:endParaRPr lang="en-US" sz="1400" dirty="0">
-              <a:solidFill>
-                <a:srgbClr val="002060"/>
-              </a:solidFill>
-            </a:endParaRPr>
-          </a:p>
-          <a:p>
-            <a:r>
-              <a:rPr lang="en-US" sz="1400" dirty="0">
-                <a:solidFill>
-                  <a:srgbClr val="002060"/>
-                </a:solidFill>
-              </a:rPr>
-              <a:t>Motto: </a:t>
             </a:r>
           </a:p>
         </p:txBody>
@@ -2481,8 +2535,8 @@
         </p:nvSpPr>
         <p:spPr>
           <a:xfrm>
-            <a:off x="2912747" y="5116009"/>
-            <a:ext cx="2127380" cy="369332"/>
+            <a:off x="3390228" y="4942896"/>
+            <a:ext cx="2006172" cy="369332"/>
           </a:xfrm>
           <a:prstGeom prst="rect">
             <a:avLst/>
@@ -2523,8 +2577,8 @@
         </p:nvSpPr>
         <p:spPr>
           <a:xfrm>
-            <a:off x="2287597" y="6199066"/>
-            <a:ext cx="3377681" cy="400110"/>
+            <a:off x="2809582" y="5773896"/>
+            <a:ext cx="3185236" cy="400110"/>
           </a:xfrm>
           <a:prstGeom prst="rect">
             <a:avLst/>
@@ -2565,8 +2619,8 @@
         </p:nvSpPr>
         <p:spPr>
           <a:xfrm>
-            <a:off x="6825393" y="5126945"/>
-            <a:ext cx="2127380" cy="369332"/>
+            <a:off x="7325506" y="4955146"/>
+            <a:ext cx="2006172" cy="369332"/>
           </a:xfrm>
           <a:prstGeom prst="rect">
             <a:avLst/>
@@ -2607,8 +2661,8 @@
         </p:nvSpPr>
         <p:spPr>
           <a:xfrm>
-            <a:off x="6200233" y="6045178"/>
-            <a:ext cx="3377681" cy="553998"/>
+            <a:off x="6722218" y="5655744"/>
+            <a:ext cx="3185236" cy="553998"/>
           </a:xfrm>
           <a:prstGeom prst="rect">
             <a:avLst/>
@@ -2631,6 +2685,1047 @@
                 </a:solidFill>
               </a:rPr>
               <a:t>Without any knowledge of programing, create AI agents for various aspects of your business and watch your margins grow while you sleep</a:t>
+            </a:r>
+          </a:p>
+        </p:txBody>
+      </p:sp>
+      <p:sp>
+        <p:nvSpPr>
+          <p:cNvPr id="21" name="TextBox 20">
+            <a:extLst>
+              <a:ext uri="{FF2B5EF4-FFF2-40B4-BE49-F238E27FC236}">
+                <a16:creationId xmlns:a16="http://schemas.microsoft.com/office/drawing/2014/main" id="{98B50C22-2081-4C55-9626-6EDE30F9C5B9}"/>
+              </a:ext>
+            </a:extLst>
+          </p:cNvPr>
+          <p:cNvSpPr txBox="1"/>
+          <p:nvPr/>
+        </p:nvSpPr>
+        <p:spPr>
+          <a:xfrm>
+            <a:off x="0" y="429208"/>
+            <a:ext cx="2147582" cy="6463308"/>
+          </a:xfrm>
+          <a:prstGeom prst="rect">
+            <a:avLst/>
+          </a:prstGeom>
+          <a:solidFill>
+            <a:srgbClr val="7030A0">
+              <a:alpha val="20000"/>
+            </a:srgbClr>
+          </a:solidFill>
+        </p:spPr>
+        <p:txBody>
+          <a:bodyPr wrap="square" rtlCol="0">
+            <a:spAutoFit/>
+          </a:bodyPr>
+          <a:lstStyle/>
+          <a:p>
+            <a:endParaRPr lang="en-US" dirty="0"/>
+          </a:p>
+          <a:p>
+            <a:endParaRPr lang="en-US" dirty="0"/>
+          </a:p>
+          <a:p>
+            <a:endParaRPr lang="en-US" dirty="0"/>
+          </a:p>
+          <a:p>
+            <a:endParaRPr lang="en-US" dirty="0"/>
+          </a:p>
+          <a:p>
+            <a:endParaRPr lang="en-US" dirty="0"/>
+          </a:p>
+          <a:p>
+            <a:endParaRPr lang="en-US" dirty="0"/>
+          </a:p>
+          <a:p>
+            <a:endParaRPr lang="en-US" dirty="0"/>
+          </a:p>
+          <a:p>
+            <a:endParaRPr lang="en-US" dirty="0"/>
+          </a:p>
+          <a:p>
+            <a:endParaRPr lang="en-US" dirty="0"/>
+          </a:p>
+          <a:p>
+            <a:endParaRPr lang="en-US" dirty="0"/>
+          </a:p>
+          <a:p>
+            <a:endParaRPr lang="en-US" dirty="0"/>
+          </a:p>
+          <a:p>
+            <a:endParaRPr lang="en-US" dirty="0"/>
+          </a:p>
+          <a:p>
+            <a:endParaRPr lang="en-US" dirty="0"/>
+          </a:p>
+          <a:p>
+            <a:endParaRPr lang="en-US" dirty="0"/>
+          </a:p>
+          <a:p>
+            <a:endParaRPr lang="en-US" dirty="0"/>
+          </a:p>
+          <a:p>
+            <a:endParaRPr lang="en-US" dirty="0"/>
+          </a:p>
+          <a:p>
+            <a:endParaRPr lang="en-US" dirty="0"/>
+          </a:p>
+          <a:p>
+            <a:endParaRPr lang="en-US" dirty="0"/>
+          </a:p>
+          <a:p>
+            <a:endParaRPr lang="en-US" dirty="0"/>
+          </a:p>
+          <a:p>
+            <a:endParaRPr lang="en-US" dirty="0"/>
+          </a:p>
+          <a:p>
+            <a:endParaRPr lang="en-US" dirty="0"/>
+          </a:p>
+          <a:p>
+            <a:endParaRPr lang="en-US" dirty="0"/>
+          </a:p>
+          <a:p>
+            <a:endParaRPr lang="en-US" dirty="0"/>
+          </a:p>
+        </p:txBody>
+      </p:sp>
+      <p:sp>
+        <p:nvSpPr>
+          <p:cNvPr id="27" name="TextBox 26">
+            <a:extLst>
+              <a:ext uri="{FF2B5EF4-FFF2-40B4-BE49-F238E27FC236}">
+                <a16:creationId xmlns:a16="http://schemas.microsoft.com/office/drawing/2014/main" id="{4F4763DB-C8CE-43AA-838F-084140D961F1}"/>
+              </a:ext>
+            </a:extLst>
+          </p:cNvPr>
+          <p:cNvSpPr txBox="1"/>
+          <p:nvPr/>
+        </p:nvSpPr>
+        <p:spPr>
+          <a:xfrm>
+            <a:off x="0" y="0"/>
+            <a:ext cx="877078" cy="523220"/>
+          </a:xfrm>
+          <a:prstGeom prst="rect">
+            <a:avLst/>
+          </a:prstGeom>
+          <a:solidFill>
+            <a:schemeClr val="tx1"/>
+          </a:solidFill>
+          <a:ln w="19050">
+            <a:solidFill>
+              <a:srgbClr val="7030A0"/>
+            </a:solidFill>
+          </a:ln>
+        </p:spPr>
+        <p:txBody>
+          <a:bodyPr wrap="square" rtlCol="0">
+            <a:spAutoFit/>
+          </a:bodyPr>
+          <a:lstStyle/>
+          <a:p>
+            <a:r>
+              <a:rPr lang="en-US" sz="1400" dirty="0" err="1">
+                <a:solidFill>
+                  <a:srgbClr val="002060"/>
+                </a:solidFill>
+              </a:rPr>
+              <a:t>fhrhdai</a:t>
+            </a:r>
+            <a:endParaRPr lang="en-US" sz="1400" dirty="0">
+              <a:solidFill>
+                <a:srgbClr val="002060"/>
+              </a:solidFill>
+            </a:endParaRPr>
+          </a:p>
+          <a:p>
+            <a:r>
+              <a:rPr lang="en-US" sz="1400" dirty="0">
+                <a:solidFill>
+                  <a:srgbClr val="002060"/>
+                </a:solidFill>
+              </a:rPr>
+              <a:t>Motto: </a:t>
+            </a:r>
+          </a:p>
+        </p:txBody>
+      </p:sp>
+      <p:sp>
+        <p:nvSpPr>
+          <p:cNvPr id="22" name="TextBox 21">
+            <a:extLst>
+              <a:ext uri="{FF2B5EF4-FFF2-40B4-BE49-F238E27FC236}">
+                <a16:creationId xmlns:a16="http://schemas.microsoft.com/office/drawing/2014/main" id="{10FA5A16-554F-4AEE-AE1A-89F20C1AD550}"/>
+              </a:ext>
+            </a:extLst>
+          </p:cNvPr>
+          <p:cNvSpPr txBox="1"/>
+          <p:nvPr/>
+        </p:nvSpPr>
+        <p:spPr>
+          <a:xfrm>
+            <a:off x="20202" y="1659790"/>
+            <a:ext cx="2127380" cy="246221"/>
+          </a:xfrm>
+          <a:prstGeom prst="rect">
+            <a:avLst/>
+          </a:prstGeom>
+          <a:solidFill>
+            <a:schemeClr val="tx1"/>
+          </a:solidFill>
+        </p:spPr>
+        <p:txBody>
+          <a:bodyPr wrap="square" rtlCol="0">
+            <a:spAutoFit/>
+          </a:bodyPr>
+          <a:lstStyle/>
+          <a:p>
+            <a:pPr algn="ctr"/>
+            <a:r>
+              <a:rPr lang="en-US" sz="1000" dirty="0">
+                <a:solidFill>
+                  <a:srgbClr val="002060"/>
+                </a:solidFill>
+              </a:rPr>
+              <a:t>Education</a:t>
+            </a:r>
+          </a:p>
+        </p:txBody>
+      </p:sp>
+      <p:sp>
+        <p:nvSpPr>
+          <p:cNvPr id="23" name="TextBox 22">
+            <a:extLst>
+              <a:ext uri="{FF2B5EF4-FFF2-40B4-BE49-F238E27FC236}">
+                <a16:creationId xmlns:a16="http://schemas.microsoft.com/office/drawing/2014/main" id="{92785D63-DB6E-4426-87BE-4D61D763874C}"/>
+              </a:ext>
+            </a:extLst>
+          </p:cNvPr>
+          <p:cNvSpPr txBox="1"/>
+          <p:nvPr/>
+        </p:nvSpPr>
+        <p:spPr>
+          <a:xfrm>
+            <a:off x="10100" y="1994804"/>
+            <a:ext cx="2127380" cy="246221"/>
+          </a:xfrm>
+          <a:prstGeom prst="rect">
+            <a:avLst/>
+          </a:prstGeom>
+          <a:solidFill>
+            <a:schemeClr val="tx1"/>
+          </a:solidFill>
+        </p:spPr>
+        <p:txBody>
+          <a:bodyPr wrap="square" rtlCol="0">
+            <a:spAutoFit/>
+          </a:bodyPr>
+          <a:lstStyle/>
+          <a:p>
+            <a:pPr algn="ctr"/>
+            <a:r>
+              <a:rPr lang="en-US" sz="1000" dirty="0">
+                <a:solidFill>
+                  <a:srgbClr val="002060"/>
+                </a:solidFill>
+              </a:rPr>
+              <a:t>Public</a:t>
+            </a:r>
+          </a:p>
+        </p:txBody>
+      </p:sp>
+      <p:sp>
+        <p:nvSpPr>
+          <p:cNvPr id="25" name="TextBox 24">
+            <a:extLst>
+              <a:ext uri="{FF2B5EF4-FFF2-40B4-BE49-F238E27FC236}">
+                <a16:creationId xmlns:a16="http://schemas.microsoft.com/office/drawing/2014/main" id="{5F886A37-61CC-447F-84B4-14C249DE160E}"/>
+              </a:ext>
+            </a:extLst>
+          </p:cNvPr>
+          <p:cNvSpPr txBox="1"/>
+          <p:nvPr/>
+        </p:nvSpPr>
+        <p:spPr>
+          <a:xfrm>
+            <a:off x="-2" y="2347044"/>
+            <a:ext cx="2127380" cy="246221"/>
+          </a:xfrm>
+          <a:prstGeom prst="rect">
+            <a:avLst/>
+          </a:prstGeom>
+          <a:solidFill>
+            <a:schemeClr val="tx1"/>
+          </a:solidFill>
+        </p:spPr>
+        <p:txBody>
+          <a:bodyPr wrap="square" rtlCol="0">
+            <a:spAutoFit/>
+          </a:bodyPr>
+          <a:lstStyle/>
+          <a:p>
+            <a:pPr algn="ctr"/>
+            <a:r>
+              <a:rPr lang="en-US" sz="1000" dirty="0">
+                <a:solidFill>
+                  <a:srgbClr val="002060"/>
+                </a:solidFill>
+              </a:rPr>
+              <a:t>Business</a:t>
+            </a:r>
+          </a:p>
+        </p:txBody>
+      </p:sp>
+      <p:sp>
+        <p:nvSpPr>
+          <p:cNvPr id="2" name="Rectangle 1">
+            <a:extLst>
+              <a:ext uri="{FF2B5EF4-FFF2-40B4-BE49-F238E27FC236}">
+                <a16:creationId xmlns:a16="http://schemas.microsoft.com/office/drawing/2014/main" id="{E6981EE0-B9FD-44CB-BD35-9FB6DB6AAE23}"/>
+              </a:ext>
+            </a:extLst>
+          </p:cNvPr>
+          <p:cNvSpPr/>
+          <p:nvPr/>
+        </p:nvSpPr>
+        <p:spPr>
+          <a:xfrm>
+            <a:off x="1733797" y="523220"/>
+            <a:ext cx="393581" cy="246221"/>
+          </a:xfrm>
+          <a:prstGeom prst="rect">
+            <a:avLst/>
+          </a:prstGeom>
+          <a:solidFill>
+            <a:schemeClr val="tx1"/>
+          </a:solidFill>
+          <a:ln>
+            <a:noFill/>
+          </a:ln>
+        </p:spPr>
+        <p:style>
+          <a:lnRef idx="2">
+            <a:schemeClr val="accent1">
+              <a:shade val="50000"/>
+            </a:schemeClr>
+          </a:lnRef>
+          <a:fillRef idx="1">
+            <a:schemeClr val="accent1"/>
+          </a:fillRef>
+          <a:effectRef idx="0">
+            <a:schemeClr val="accent1"/>
+          </a:effectRef>
+          <a:fontRef idx="minor">
+            <a:schemeClr val="lt1"/>
+          </a:fontRef>
+        </p:style>
+        <p:txBody>
+          <a:bodyPr rtlCol="0" anchor="ctr"/>
+          <a:lstStyle/>
+          <a:p>
+            <a:pPr algn="ctr"/>
+            <a:endParaRPr lang="en-US"/>
+          </a:p>
+        </p:txBody>
+      </p:sp>
+      <p:cxnSp>
+        <p:nvCxnSpPr>
+          <p:cNvPr id="4" name="Straight Connector 3">
+            <a:extLst>
+              <a:ext uri="{FF2B5EF4-FFF2-40B4-BE49-F238E27FC236}">
+                <a16:creationId xmlns:a16="http://schemas.microsoft.com/office/drawing/2014/main" id="{87510F87-C1D3-412A-BF7D-05BC5D2E4718}"/>
+              </a:ext>
+            </a:extLst>
+          </p:cNvPr>
+          <p:cNvCxnSpPr/>
+          <p:nvPr/>
+        </p:nvCxnSpPr>
+        <p:spPr>
+          <a:xfrm>
+            <a:off x="1800227" y="701040"/>
+            <a:ext cx="266700" cy="0"/>
+          </a:xfrm>
+          <a:prstGeom prst="line">
+            <a:avLst/>
+          </a:prstGeom>
+          <a:ln w="19050">
+            <a:solidFill>
+              <a:schemeClr val="bg1"/>
+            </a:solidFill>
+          </a:ln>
+        </p:spPr>
+        <p:style>
+          <a:lnRef idx="1">
+            <a:schemeClr val="accent1"/>
+          </a:lnRef>
+          <a:fillRef idx="0">
+            <a:schemeClr val="accent1"/>
+          </a:fillRef>
+          <a:effectRef idx="0">
+            <a:schemeClr val="accent1"/>
+          </a:effectRef>
+          <a:fontRef idx="minor">
+            <a:schemeClr val="tx1"/>
+          </a:fontRef>
+        </p:style>
+      </p:cxnSp>
+      <p:cxnSp>
+        <p:nvCxnSpPr>
+          <p:cNvPr id="31" name="Straight Connector 30">
+            <a:extLst>
+              <a:ext uri="{FF2B5EF4-FFF2-40B4-BE49-F238E27FC236}">
+                <a16:creationId xmlns:a16="http://schemas.microsoft.com/office/drawing/2014/main" id="{F5AADB65-4123-4D22-8ECF-16783AAC85CB}"/>
+              </a:ext>
+            </a:extLst>
+          </p:cNvPr>
+          <p:cNvCxnSpPr/>
+          <p:nvPr/>
+        </p:nvCxnSpPr>
+        <p:spPr>
+          <a:xfrm>
+            <a:off x="1800227" y="579120"/>
+            <a:ext cx="266700" cy="0"/>
+          </a:xfrm>
+          <a:prstGeom prst="line">
+            <a:avLst/>
+          </a:prstGeom>
+          <a:ln w="19050">
+            <a:solidFill>
+              <a:schemeClr val="bg1"/>
+            </a:solidFill>
+          </a:ln>
+        </p:spPr>
+        <p:style>
+          <a:lnRef idx="1">
+            <a:schemeClr val="accent1"/>
+          </a:lnRef>
+          <a:fillRef idx="0">
+            <a:schemeClr val="accent1"/>
+          </a:fillRef>
+          <a:effectRef idx="0">
+            <a:schemeClr val="accent1"/>
+          </a:effectRef>
+          <a:fontRef idx="minor">
+            <a:schemeClr val="tx1"/>
+          </a:fontRef>
+        </p:style>
+      </p:cxnSp>
+      <p:cxnSp>
+        <p:nvCxnSpPr>
+          <p:cNvPr id="33" name="Straight Connector 32">
+            <a:extLst>
+              <a:ext uri="{FF2B5EF4-FFF2-40B4-BE49-F238E27FC236}">
+                <a16:creationId xmlns:a16="http://schemas.microsoft.com/office/drawing/2014/main" id="{99EF8E86-73AF-4C88-AE4C-902A02EB6334}"/>
+              </a:ext>
+            </a:extLst>
+          </p:cNvPr>
+          <p:cNvCxnSpPr/>
+          <p:nvPr/>
+        </p:nvCxnSpPr>
+        <p:spPr>
+          <a:xfrm>
+            <a:off x="1800227" y="640080"/>
+            <a:ext cx="266700" cy="0"/>
+          </a:xfrm>
+          <a:prstGeom prst="line">
+            <a:avLst/>
+          </a:prstGeom>
+          <a:ln w="19050">
+            <a:solidFill>
+              <a:schemeClr val="bg1"/>
+            </a:solidFill>
+          </a:ln>
+        </p:spPr>
+        <p:style>
+          <a:lnRef idx="1">
+            <a:schemeClr val="accent1"/>
+          </a:lnRef>
+          <a:fillRef idx="0">
+            <a:schemeClr val="accent1"/>
+          </a:fillRef>
+          <a:effectRef idx="0">
+            <a:schemeClr val="accent1"/>
+          </a:effectRef>
+          <a:fontRef idx="minor">
+            <a:schemeClr val="tx1"/>
+          </a:fontRef>
+        </p:style>
+      </p:cxnSp>
+      <p:sp>
+        <p:nvSpPr>
+          <p:cNvPr id="34" name="TextBox 33">
+            <a:extLst>
+              <a:ext uri="{FF2B5EF4-FFF2-40B4-BE49-F238E27FC236}">
+                <a16:creationId xmlns:a16="http://schemas.microsoft.com/office/drawing/2014/main" id="{7BFA6E58-F963-4B03-B4FB-3B328B196738}"/>
+              </a:ext>
+            </a:extLst>
+          </p:cNvPr>
+          <p:cNvSpPr txBox="1"/>
+          <p:nvPr/>
+        </p:nvSpPr>
+        <p:spPr>
+          <a:xfrm>
+            <a:off x="10552921" y="429208"/>
+            <a:ext cx="1669305" cy="6463308"/>
+          </a:xfrm>
+          <a:prstGeom prst="rect">
+            <a:avLst/>
+          </a:prstGeom>
+          <a:solidFill>
+            <a:srgbClr val="7030A0">
+              <a:alpha val="20000"/>
+            </a:srgbClr>
+          </a:solidFill>
+        </p:spPr>
+        <p:txBody>
+          <a:bodyPr wrap="square" rtlCol="0">
+            <a:spAutoFit/>
+          </a:bodyPr>
+          <a:lstStyle/>
+          <a:p>
+            <a:endParaRPr lang="en-US" dirty="0"/>
+          </a:p>
+          <a:p>
+            <a:endParaRPr lang="en-US" dirty="0"/>
+          </a:p>
+          <a:p>
+            <a:endParaRPr lang="en-US" dirty="0"/>
+          </a:p>
+          <a:p>
+            <a:endParaRPr lang="en-US" dirty="0"/>
+          </a:p>
+          <a:p>
+            <a:endParaRPr lang="en-US" dirty="0"/>
+          </a:p>
+          <a:p>
+            <a:endParaRPr lang="en-US" dirty="0"/>
+          </a:p>
+          <a:p>
+            <a:endParaRPr lang="en-US" dirty="0"/>
+          </a:p>
+          <a:p>
+            <a:endParaRPr lang="en-US" dirty="0"/>
+          </a:p>
+          <a:p>
+            <a:endParaRPr lang="en-US" dirty="0"/>
+          </a:p>
+          <a:p>
+            <a:endParaRPr lang="en-US" dirty="0"/>
+          </a:p>
+          <a:p>
+            <a:endParaRPr lang="en-US" dirty="0"/>
+          </a:p>
+          <a:p>
+            <a:endParaRPr lang="en-US" dirty="0"/>
+          </a:p>
+          <a:p>
+            <a:endParaRPr lang="en-US" dirty="0"/>
+          </a:p>
+          <a:p>
+            <a:endParaRPr lang="en-US" dirty="0"/>
+          </a:p>
+          <a:p>
+            <a:endParaRPr lang="en-US" dirty="0"/>
+          </a:p>
+          <a:p>
+            <a:endParaRPr lang="en-US" dirty="0"/>
+          </a:p>
+          <a:p>
+            <a:endParaRPr lang="en-US" dirty="0"/>
+          </a:p>
+          <a:p>
+            <a:endParaRPr lang="en-US" dirty="0"/>
+          </a:p>
+          <a:p>
+            <a:endParaRPr lang="en-US" dirty="0"/>
+          </a:p>
+          <a:p>
+            <a:endParaRPr lang="en-US" dirty="0"/>
+          </a:p>
+          <a:p>
+            <a:endParaRPr lang="en-US" dirty="0"/>
+          </a:p>
+          <a:p>
+            <a:endParaRPr lang="en-US" dirty="0"/>
+          </a:p>
+          <a:p>
+            <a:endParaRPr lang="en-US" dirty="0"/>
+          </a:p>
+        </p:txBody>
+      </p:sp>
+      <p:sp>
+        <p:nvSpPr>
+          <p:cNvPr id="26" name="TextBox 25">
+            <a:extLst>
+              <a:ext uri="{FF2B5EF4-FFF2-40B4-BE49-F238E27FC236}">
+                <a16:creationId xmlns:a16="http://schemas.microsoft.com/office/drawing/2014/main" id="{7F1EC8E4-3C43-4F63-8AF7-D4E488BD97AD}"/>
+              </a:ext>
+            </a:extLst>
+          </p:cNvPr>
+          <p:cNvSpPr txBox="1"/>
+          <p:nvPr/>
+        </p:nvSpPr>
+        <p:spPr>
+          <a:xfrm>
+            <a:off x="10795518" y="0"/>
+            <a:ext cx="1396481" cy="523220"/>
+          </a:xfrm>
+          <a:prstGeom prst="rect">
+            <a:avLst/>
+          </a:prstGeom>
+          <a:solidFill>
+            <a:schemeClr val="tx1"/>
+          </a:solidFill>
+          <a:ln w="19050">
+            <a:solidFill>
+              <a:srgbClr val="7030A0"/>
+            </a:solidFill>
+          </a:ln>
+        </p:spPr>
+        <p:txBody>
+          <a:bodyPr wrap="square" rtlCol="0">
+            <a:spAutoFit/>
+          </a:bodyPr>
+          <a:lstStyle/>
+          <a:p>
+            <a:r>
+              <a:rPr lang="en-US" sz="1400" dirty="0">
+                <a:solidFill>
+                  <a:srgbClr val="002060"/>
+                </a:solidFill>
+              </a:rPr>
+              <a:t>Profile Picture and other info</a:t>
+            </a:r>
+          </a:p>
+        </p:txBody>
+      </p:sp>
+      <p:sp>
+        <p:nvSpPr>
+          <p:cNvPr id="35" name="Rectangle 34">
+            <a:extLst>
+              <a:ext uri="{FF2B5EF4-FFF2-40B4-BE49-F238E27FC236}">
+                <a16:creationId xmlns:a16="http://schemas.microsoft.com/office/drawing/2014/main" id="{4EA450B9-8E7B-4B9D-837F-1417610FE954}"/>
+              </a:ext>
+            </a:extLst>
+          </p:cNvPr>
+          <p:cNvSpPr/>
+          <p:nvPr/>
+        </p:nvSpPr>
+        <p:spPr>
+          <a:xfrm>
+            <a:off x="10595738" y="645678"/>
+            <a:ext cx="393581" cy="246221"/>
+          </a:xfrm>
+          <a:prstGeom prst="rect">
+            <a:avLst/>
+          </a:prstGeom>
+          <a:solidFill>
+            <a:schemeClr val="tx1"/>
+          </a:solidFill>
+          <a:ln>
+            <a:noFill/>
+          </a:ln>
+        </p:spPr>
+        <p:style>
+          <a:lnRef idx="2">
+            <a:schemeClr val="accent1">
+              <a:shade val="50000"/>
+            </a:schemeClr>
+          </a:lnRef>
+          <a:fillRef idx="1">
+            <a:schemeClr val="accent1"/>
+          </a:fillRef>
+          <a:effectRef idx="0">
+            <a:schemeClr val="accent1"/>
+          </a:effectRef>
+          <a:fontRef idx="minor">
+            <a:schemeClr val="lt1"/>
+          </a:fontRef>
+        </p:style>
+        <p:txBody>
+          <a:bodyPr rtlCol="0" anchor="ctr"/>
+          <a:lstStyle/>
+          <a:p>
+            <a:pPr algn="ctr"/>
+            <a:endParaRPr lang="en-US"/>
+          </a:p>
+        </p:txBody>
+      </p:sp>
+      <p:cxnSp>
+        <p:nvCxnSpPr>
+          <p:cNvPr id="36" name="Straight Connector 35">
+            <a:extLst>
+              <a:ext uri="{FF2B5EF4-FFF2-40B4-BE49-F238E27FC236}">
+                <a16:creationId xmlns:a16="http://schemas.microsoft.com/office/drawing/2014/main" id="{737073CD-E55F-4D0B-AB68-1ED89F2A334A}"/>
+              </a:ext>
+            </a:extLst>
+          </p:cNvPr>
+          <p:cNvCxnSpPr/>
+          <p:nvPr/>
+        </p:nvCxnSpPr>
+        <p:spPr>
+          <a:xfrm>
+            <a:off x="10662168" y="823498"/>
+            <a:ext cx="266700" cy="0"/>
+          </a:xfrm>
+          <a:prstGeom prst="line">
+            <a:avLst/>
+          </a:prstGeom>
+          <a:ln w="19050">
+            <a:solidFill>
+              <a:schemeClr val="bg1"/>
+            </a:solidFill>
+          </a:ln>
+        </p:spPr>
+        <p:style>
+          <a:lnRef idx="1">
+            <a:schemeClr val="accent1"/>
+          </a:lnRef>
+          <a:fillRef idx="0">
+            <a:schemeClr val="accent1"/>
+          </a:fillRef>
+          <a:effectRef idx="0">
+            <a:schemeClr val="accent1"/>
+          </a:effectRef>
+          <a:fontRef idx="minor">
+            <a:schemeClr val="tx1"/>
+          </a:fontRef>
+        </p:style>
+      </p:cxnSp>
+      <p:cxnSp>
+        <p:nvCxnSpPr>
+          <p:cNvPr id="37" name="Straight Connector 36">
+            <a:extLst>
+              <a:ext uri="{FF2B5EF4-FFF2-40B4-BE49-F238E27FC236}">
+                <a16:creationId xmlns:a16="http://schemas.microsoft.com/office/drawing/2014/main" id="{775A6833-6929-4119-A4C9-C06FFD09C297}"/>
+              </a:ext>
+            </a:extLst>
+          </p:cNvPr>
+          <p:cNvCxnSpPr/>
+          <p:nvPr/>
+        </p:nvCxnSpPr>
+        <p:spPr>
+          <a:xfrm>
+            <a:off x="10662168" y="701578"/>
+            <a:ext cx="266700" cy="0"/>
+          </a:xfrm>
+          <a:prstGeom prst="line">
+            <a:avLst/>
+          </a:prstGeom>
+          <a:ln w="19050">
+            <a:solidFill>
+              <a:schemeClr val="bg1"/>
+            </a:solidFill>
+          </a:ln>
+        </p:spPr>
+        <p:style>
+          <a:lnRef idx="1">
+            <a:schemeClr val="accent1"/>
+          </a:lnRef>
+          <a:fillRef idx="0">
+            <a:schemeClr val="accent1"/>
+          </a:fillRef>
+          <a:effectRef idx="0">
+            <a:schemeClr val="accent1"/>
+          </a:effectRef>
+          <a:fontRef idx="minor">
+            <a:schemeClr val="tx1"/>
+          </a:fontRef>
+        </p:style>
+      </p:cxnSp>
+      <p:cxnSp>
+        <p:nvCxnSpPr>
+          <p:cNvPr id="38" name="Straight Connector 37">
+            <a:extLst>
+              <a:ext uri="{FF2B5EF4-FFF2-40B4-BE49-F238E27FC236}">
+                <a16:creationId xmlns:a16="http://schemas.microsoft.com/office/drawing/2014/main" id="{86D35140-A83D-4E7F-8D1E-8E24CE5F69CA}"/>
+              </a:ext>
+            </a:extLst>
+          </p:cNvPr>
+          <p:cNvCxnSpPr/>
+          <p:nvPr/>
+        </p:nvCxnSpPr>
+        <p:spPr>
+          <a:xfrm>
+            <a:off x="10662168" y="762538"/>
+            <a:ext cx="266700" cy="0"/>
+          </a:xfrm>
+          <a:prstGeom prst="line">
+            <a:avLst/>
+          </a:prstGeom>
+          <a:ln w="19050">
+            <a:solidFill>
+              <a:schemeClr val="bg1"/>
+            </a:solidFill>
+          </a:ln>
+        </p:spPr>
+        <p:style>
+          <a:lnRef idx="1">
+            <a:schemeClr val="accent1"/>
+          </a:lnRef>
+          <a:fillRef idx="0">
+            <a:schemeClr val="accent1"/>
+          </a:fillRef>
+          <a:effectRef idx="0">
+            <a:schemeClr val="accent1"/>
+          </a:effectRef>
+          <a:fontRef idx="minor">
+            <a:schemeClr val="tx1"/>
+          </a:fontRef>
+        </p:style>
+      </p:cxnSp>
+      <p:sp>
+        <p:nvSpPr>
+          <p:cNvPr id="39" name="TextBox 38">
+            <a:extLst>
+              <a:ext uri="{FF2B5EF4-FFF2-40B4-BE49-F238E27FC236}">
+                <a16:creationId xmlns:a16="http://schemas.microsoft.com/office/drawing/2014/main" id="{B1C2286A-A19E-413C-851F-FA5FB1E2DFBE}"/>
+              </a:ext>
+            </a:extLst>
+          </p:cNvPr>
+          <p:cNvSpPr txBox="1"/>
+          <p:nvPr/>
+        </p:nvSpPr>
+        <p:spPr>
+          <a:xfrm>
+            <a:off x="95579" y="1260520"/>
+            <a:ext cx="1976626" cy="369332"/>
+          </a:xfrm>
+          <a:prstGeom prst="rect">
+            <a:avLst/>
+          </a:prstGeom>
+          <a:noFill/>
+        </p:spPr>
+        <p:txBody>
+          <a:bodyPr wrap="square" rtlCol="0">
+            <a:spAutoFit/>
+          </a:bodyPr>
+          <a:lstStyle/>
+          <a:p>
+            <a:pPr algn="ctr"/>
+            <a:r>
+              <a:rPr lang="en-US" dirty="0">
+                <a:solidFill>
+                  <a:srgbClr val="002060"/>
+                </a:solidFill>
+              </a:rPr>
+              <a:t>Popular AI Agents</a:t>
+            </a:r>
+          </a:p>
+        </p:txBody>
+      </p:sp>
+      <p:sp>
+        <p:nvSpPr>
+          <p:cNvPr id="40" name="TextBox 39">
+            <a:extLst>
+              <a:ext uri="{FF2B5EF4-FFF2-40B4-BE49-F238E27FC236}">
+                <a16:creationId xmlns:a16="http://schemas.microsoft.com/office/drawing/2014/main" id="{9E2CCD7A-7CD3-4914-8760-A05E66871A18}"/>
+              </a:ext>
+            </a:extLst>
+          </p:cNvPr>
+          <p:cNvSpPr txBox="1"/>
+          <p:nvPr/>
+        </p:nvSpPr>
+        <p:spPr>
+          <a:xfrm>
+            <a:off x="10552921" y="1753290"/>
+            <a:ext cx="1639079" cy="246221"/>
+          </a:xfrm>
+          <a:prstGeom prst="rect">
+            <a:avLst/>
+          </a:prstGeom>
+          <a:solidFill>
+            <a:schemeClr val="tx1"/>
+          </a:solidFill>
+        </p:spPr>
+        <p:txBody>
+          <a:bodyPr wrap="square" rtlCol="0">
+            <a:spAutoFit/>
+          </a:bodyPr>
+          <a:lstStyle/>
+          <a:p>
+            <a:pPr algn="ctr"/>
+            <a:r>
+              <a:rPr lang="en-US" sz="1000" dirty="0">
+                <a:solidFill>
+                  <a:srgbClr val="002060"/>
+                </a:solidFill>
+              </a:rPr>
+              <a:t>Active</a:t>
+            </a:r>
+          </a:p>
+        </p:txBody>
+      </p:sp>
+      <p:sp>
+        <p:nvSpPr>
+          <p:cNvPr id="41" name="TextBox 40">
+            <a:extLst>
+              <a:ext uri="{FF2B5EF4-FFF2-40B4-BE49-F238E27FC236}">
+                <a16:creationId xmlns:a16="http://schemas.microsoft.com/office/drawing/2014/main" id="{5544AA18-D84E-4499-8EA2-7944FA4C970C}"/>
+              </a:ext>
+            </a:extLst>
+          </p:cNvPr>
+          <p:cNvSpPr txBox="1"/>
+          <p:nvPr/>
+        </p:nvSpPr>
+        <p:spPr>
+          <a:xfrm>
+            <a:off x="10552921" y="2088304"/>
+            <a:ext cx="1628979" cy="246221"/>
+          </a:xfrm>
+          <a:prstGeom prst="rect">
+            <a:avLst/>
+          </a:prstGeom>
+          <a:solidFill>
+            <a:schemeClr val="tx1"/>
+          </a:solidFill>
+        </p:spPr>
+        <p:txBody>
+          <a:bodyPr wrap="square" rtlCol="0">
+            <a:spAutoFit/>
+          </a:bodyPr>
+          <a:lstStyle/>
+          <a:p>
+            <a:pPr algn="ctr"/>
+            <a:r>
+              <a:rPr lang="en-US" sz="1000" dirty="0">
+                <a:solidFill>
+                  <a:srgbClr val="002060"/>
+                </a:solidFill>
+              </a:rPr>
+              <a:t>Inactive</a:t>
+            </a:r>
+          </a:p>
+        </p:txBody>
+      </p:sp>
+      <p:sp>
+        <p:nvSpPr>
+          <p:cNvPr id="42" name="TextBox 41">
+            <a:extLst>
+              <a:ext uri="{FF2B5EF4-FFF2-40B4-BE49-F238E27FC236}">
+                <a16:creationId xmlns:a16="http://schemas.microsoft.com/office/drawing/2014/main" id="{0056335E-EABE-4A6A-9DAB-D5278C6188AB}"/>
+              </a:ext>
+            </a:extLst>
+          </p:cNvPr>
+          <p:cNvSpPr txBox="1"/>
+          <p:nvPr/>
+        </p:nvSpPr>
+        <p:spPr>
+          <a:xfrm>
+            <a:off x="10552921" y="2440544"/>
+            <a:ext cx="1639079" cy="246221"/>
+          </a:xfrm>
+          <a:prstGeom prst="rect">
+            <a:avLst/>
+          </a:prstGeom>
+          <a:solidFill>
+            <a:schemeClr val="tx1"/>
+          </a:solidFill>
+        </p:spPr>
+        <p:txBody>
+          <a:bodyPr wrap="square" rtlCol="0">
+            <a:spAutoFit/>
+          </a:bodyPr>
+          <a:lstStyle/>
+          <a:p>
+            <a:pPr algn="ctr"/>
+            <a:r>
+              <a:rPr lang="en-US" sz="1000" dirty="0">
+                <a:solidFill>
+                  <a:srgbClr val="002060"/>
+                </a:solidFill>
+              </a:rPr>
+              <a:t>Retired</a:t>
+            </a:r>
+          </a:p>
+        </p:txBody>
+      </p:sp>
+      <p:sp>
+        <p:nvSpPr>
+          <p:cNvPr id="43" name="TextBox 42">
+            <a:extLst>
+              <a:ext uri="{FF2B5EF4-FFF2-40B4-BE49-F238E27FC236}">
+                <a16:creationId xmlns:a16="http://schemas.microsoft.com/office/drawing/2014/main" id="{B444EAD6-2E80-4B5F-89AF-07294F206A9E}"/>
+              </a:ext>
+            </a:extLst>
+          </p:cNvPr>
+          <p:cNvSpPr txBox="1"/>
+          <p:nvPr/>
+        </p:nvSpPr>
+        <p:spPr>
+          <a:xfrm>
+            <a:off x="9563878" y="669609"/>
+            <a:ext cx="829137" cy="307777"/>
+          </a:xfrm>
+          <a:prstGeom prst="rect">
+            <a:avLst/>
+          </a:prstGeom>
+          <a:solidFill>
+            <a:schemeClr val="bg1">
+              <a:alpha val="20000"/>
+            </a:schemeClr>
+          </a:solidFill>
+        </p:spPr>
+        <p:txBody>
+          <a:bodyPr wrap="square" rtlCol="0">
+            <a:spAutoFit/>
+          </a:bodyPr>
+          <a:lstStyle/>
+          <a:p>
+            <a:pPr algn="ctr"/>
+            <a:r>
+              <a:rPr lang="en-US" sz="1400" dirty="0">
+                <a:solidFill>
+                  <a:srgbClr val="002060"/>
+                </a:solidFill>
+              </a:rPr>
+              <a:t>Login</a:t>
+            </a:r>
+          </a:p>
+        </p:txBody>
+      </p:sp>
+      <p:sp>
+        <p:nvSpPr>
+          <p:cNvPr id="44" name="TextBox 43">
+            <a:extLst>
+              <a:ext uri="{FF2B5EF4-FFF2-40B4-BE49-F238E27FC236}">
+                <a16:creationId xmlns:a16="http://schemas.microsoft.com/office/drawing/2014/main" id="{599D62E3-F61F-4F0F-BA26-F55C7510708D}"/>
+              </a:ext>
+            </a:extLst>
+          </p:cNvPr>
+          <p:cNvSpPr txBox="1"/>
+          <p:nvPr/>
+        </p:nvSpPr>
+        <p:spPr>
+          <a:xfrm>
+            <a:off x="9563878" y="1021295"/>
+            <a:ext cx="829137" cy="307777"/>
+          </a:xfrm>
+          <a:prstGeom prst="rect">
+            <a:avLst/>
+          </a:prstGeom>
+          <a:solidFill>
+            <a:schemeClr val="bg1">
+              <a:alpha val="20000"/>
+            </a:schemeClr>
+          </a:solidFill>
+        </p:spPr>
+        <p:txBody>
+          <a:bodyPr wrap="square" rtlCol="0">
+            <a:spAutoFit/>
+          </a:bodyPr>
+          <a:lstStyle/>
+          <a:p>
+            <a:pPr algn="ctr"/>
+            <a:r>
+              <a:rPr lang="en-US" sz="1400" dirty="0">
+                <a:solidFill>
+                  <a:srgbClr val="002060"/>
+                </a:solidFill>
+              </a:rPr>
+              <a:t>Register</a:t>
             </a:r>
           </a:p>
         </p:txBody>

</xml_diff>

<commit_message>
Live tiles of active AI currently in use by users
</commit_message>
<xml_diff>
--- a/fhrhdai.pptx
+++ b/fhrhdai.pptx
@@ -133,7 +133,7 @@
 
 <file path=ppt/commentAuthors.xml><?xml version="1.0" encoding="utf-8"?>
 <p:cmAuthorLst xmlns:a="http://schemas.openxmlformats.org/drawingml/2006/main" xmlns:r="http://schemas.openxmlformats.org/officeDocument/2006/relationships" xmlns:p="http://schemas.openxmlformats.org/presentationml/2006/main">
-  <p:cmAuthor id="1" name="Mad Scientist" initials="MS" lastIdx="2" clrIdx="0">
+  <p:cmAuthor id="1" name="Mad Scientist" initials="MS" lastIdx="3" clrIdx="0">
     <p:extLst>
       <p:ext uri="{19B8F6BF-5375-455C-9EA6-DF929625EA0E}">
         <p15:presenceInfo xmlns:p15="http://schemas.microsoft.com/office/powerpoint/2012/main" userId="e4c58536287370fd" providerId="Windows Live"/>
@@ -146,7 +146,7 @@
 <file path=ppt/revisionInfo.xml><?xml version="1.0" encoding="utf-8"?>
 <p1510:revInfo xmlns:a="http://schemas.openxmlformats.org/drawingml/2006/main" xmlns:r="http://schemas.openxmlformats.org/officeDocument/2006/relationships" xmlns:p1510="http://schemas.microsoft.com/office/powerpoint/2015/10/main">
   <p1510:revLst>
-    <p1510:client id="{8E27B28E-0CA7-4ABF-B227-2DEC33884432}" v="346" dt="2020-04-17T23:46:28.370"/>
+    <p1510:client id="{8E27B28E-0CA7-4ABF-B227-2DEC33884432}" v="379" dt="2020-04-19T05:33:03.050"/>
   </p1510:revLst>
 </p1510:revInfo>
 </file>
@@ -156,12 +156,12 @@
   <pc:docChgLst>
     <pc:chgData name="Mad Scientist" userId="e4c58536287370fd" providerId="LiveId" clId="{8E27B28E-0CA7-4ABF-B227-2DEC33884432}"/>
     <pc:docChg chg="undo redo custSel addSld delSld modSld modSection">
-      <pc:chgData name="Mad Scientist" userId="e4c58536287370fd" providerId="LiveId" clId="{8E27B28E-0CA7-4ABF-B227-2DEC33884432}" dt="2020-04-17T23:46:28.370" v="1258" actId="207"/>
+      <pc:chgData name="Mad Scientist" userId="e4c58536287370fd" providerId="LiveId" clId="{8E27B28E-0CA7-4ABF-B227-2DEC33884432}" dt="2020-04-19T05:47:34.360" v="1337"/>
       <pc:docMkLst>
         <pc:docMk/>
       </pc:docMkLst>
       <pc:sldChg chg="addSp delSp modSp add setBg addCm modCm">
-        <pc:chgData name="Mad Scientist" userId="e4c58536287370fd" providerId="LiveId" clId="{8E27B28E-0CA7-4ABF-B227-2DEC33884432}" dt="2020-04-17T23:46:28.370" v="1258" actId="207"/>
+        <pc:chgData name="Mad Scientist" userId="e4c58536287370fd" providerId="LiveId" clId="{8E27B28E-0CA7-4ABF-B227-2DEC33884432}" dt="2020-04-19T05:47:34.360" v="1337"/>
         <pc:sldMkLst>
           <pc:docMk/>
           <pc:sldMk cId="3861153024" sldId="257"/>
@@ -191,6 +191,14 @@
           </ac:spMkLst>
         </pc:spChg>
         <pc:spChg chg="add del mod">
+          <ac:chgData name="Mad Scientist" userId="e4c58536287370fd" providerId="LiveId" clId="{8E27B28E-0CA7-4ABF-B227-2DEC33884432}" dt="2020-04-19T05:26:10.933" v="1292" actId="478"/>
+          <ac:spMkLst>
+            <pc:docMk/>
+            <pc:sldMk cId="3861153024" sldId="257"/>
+            <ac:spMk id="3" creationId="{869F750F-142C-4DE4-8C78-77703851D1A2}"/>
+          </ac:spMkLst>
+        </pc:spChg>
+        <pc:spChg chg="add del mod">
           <ac:chgData name="Mad Scientist" userId="e4c58536287370fd" providerId="LiveId" clId="{8E27B28E-0CA7-4ABF-B227-2DEC33884432}" dt="2020-04-17T13:13:28.054" v="8" actId="478"/>
           <ac:spMkLst>
             <pc:docMk/>
@@ -558,6 +566,14 @@
             <ac:spMk id="44" creationId="{599D62E3-F61F-4F0F-BA26-F55C7510708D}"/>
           </ac:spMkLst>
         </pc:spChg>
+        <pc:graphicFrameChg chg="add mod modGraphic">
+          <ac:chgData name="Mad Scientist" userId="e4c58536287370fd" providerId="LiveId" clId="{8E27B28E-0CA7-4ABF-B227-2DEC33884432}" dt="2020-04-19T05:47:34.360" v="1337"/>
+          <ac:graphicFrameMkLst>
+            <pc:docMk/>
+            <pc:sldMk cId="3861153024" sldId="257"/>
+            <ac:graphicFrameMk id="5" creationId="{F8021018-109F-4402-96DC-8FBA2A0E85CA}"/>
+          </ac:graphicFrameMkLst>
+        </pc:graphicFrameChg>
         <pc:cxnChg chg="add mod">
           <ac:chgData name="Mad Scientist" userId="e4c58536287370fd" providerId="LiveId" clId="{8E27B28E-0CA7-4ABF-B227-2DEC33884432}" dt="2020-04-17T23:18:37.364" v="949" actId="1076"/>
           <ac:cxnSpMkLst>
@@ -686,6 +702,15 @@
   <p:cm authorId="1" dt="2020-04-17T16:04:44.847" idx="2">
     <p:pos x="1353" y="270"/>
     <p:text>This pane will have in dropdown form the top 10 most common AI agent for each section. The pane should be collapsible</p:text>
+    <p:extLst>
+      <p:ext uri="{C676402C-5697-4E1C-873F-D02D1690AC5C}">
+        <p15:threadingInfo xmlns:p15="http://schemas.microsoft.com/office/powerpoint/2012/main" timeZoneBias="420"/>
+      </p:ext>
+    </p:extLst>
+  </p:cm>
+  <p:cm authorId="1" dt="2020-04-18T22:29:06.807" idx="3">
+    <p:pos x="6148" y="940"/>
+    <p:text>Live feed of popular free AI ageents created by users. This will have brief info on the AI, what it does and the top contributors.</p:text>
     <p:extLst>
       <p:ext uri="{C676402C-5697-4E1C-873F-D02D1690AC5C}">
         <p15:threadingInfo xmlns:p15="http://schemas.microsoft.com/office/powerpoint/2012/main" timeZoneBias="420"/>
@@ -880,7 +905,7 @@
           <a:p>
             <a:fld id="{88D38747-4367-4BD2-8D51-C97E202738E2}" type="datetime1">
               <a:rPr lang="en-US" smtClean="0"/>
-              <a:t>17-Apr-20</a:t>
+              <a:t>18-Apr-20</a:t>
             </a:fld>
             <a:endParaRPr lang="en-US" dirty="0"/>
           </a:p>
@@ -1115,7 +1140,7 @@
           <a:p>
             <a:fld id="{073ED0CC-082F-4160-86E5-0D6041F12778}" type="datetime1">
               <a:rPr lang="en-US" smtClean="0"/>
-              <a:t>17-Apr-20</a:t>
+              <a:t>18-Apr-20</a:t>
             </a:fld>
             <a:endParaRPr lang="en-US" dirty="0"/>
           </a:p>
@@ -3730,6 +3755,299 @@
           </a:p>
         </p:txBody>
       </p:sp>
+      <p:graphicFrame>
+        <p:nvGraphicFramePr>
+          <p:cNvPr id="5" name="Table 5">
+            <a:extLst>
+              <a:ext uri="{FF2B5EF4-FFF2-40B4-BE49-F238E27FC236}">
+                <a16:creationId xmlns:a16="http://schemas.microsoft.com/office/drawing/2014/main" id="{F8021018-109F-4402-96DC-8FBA2A0E85CA}"/>
+              </a:ext>
+            </a:extLst>
+          </p:cNvPr>
+          <p:cNvGraphicFramePr>
+            <a:graphicFrameLocks noGrp="1"/>
+          </p:cNvGraphicFramePr>
+          <p:nvPr>
+            <p:extLst>
+              <p:ext uri="{D42A27DB-BD31-4B8C-83A1-F6EECF244321}">
+                <p14:modId xmlns:p14="http://schemas.microsoft.com/office/powerpoint/2010/main" val="2592296084"/>
+              </p:ext>
+            </p:extLst>
+          </p:nvPr>
+        </p:nvGraphicFramePr>
+        <p:xfrm>
+          <a:off x="2157682" y="630142"/>
+          <a:ext cx="7317126" cy="1925548"/>
+        </p:xfrm>
+        <a:graphic>
+          <a:graphicData uri="http://schemas.openxmlformats.org/drawingml/2006/table">
+            <a:tbl>
+              <a:tblPr firstRow="1" bandRow="1">
+                <a:tableStyleId>{5C22544A-7EE6-4342-B048-85BDC9FD1C3A}</a:tableStyleId>
+              </a:tblPr>
+              <a:tblGrid>
+                <a:gridCol w="813014">
+                  <a:extLst>
+                    <a:ext uri="{9D8B030D-6E8A-4147-A177-3AD203B41FA5}">
+                      <a16:colId xmlns:a16="http://schemas.microsoft.com/office/drawing/2014/main" val="1093708580"/>
+                    </a:ext>
+                  </a:extLst>
+                </a:gridCol>
+                <a:gridCol w="813014">
+                  <a:extLst>
+                    <a:ext uri="{9D8B030D-6E8A-4147-A177-3AD203B41FA5}">
+                      <a16:colId xmlns:a16="http://schemas.microsoft.com/office/drawing/2014/main" val="942559929"/>
+                    </a:ext>
+                  </a:extLst>
+                </a:gridCol>
+                <a:gridCol w="813014">
+                  <a:extLst>
+                    <a:ext uri="{9D8B030D-6E8A-4147-A177-3AD203B41FA5}">
+                      <a16:colId xmlns:a16="http://schemas.microsoft.com/office/drawing/2014/main" val="1666137619"/>
+                    </a:ext>
+                  </a:extLst>
+                </a:gridCol>
+                <a:gridCol w="813014">
+                  <a:extLst>
+                    <a:ext uri="{9D8B030D-6E8A-4147-A177-3AD203B41FA5}">
+                      <a16:colId xmlns:a16="http://schemas.microsoft.com/office/drawing/2014/main" val="685101800"/>
+                    </a:ext>
+                  </a:extLst>
+                </a:gridCol>
+                <a:gridCol w="813014">
+                  <a:extLst>
+                    <a:ext uri="{9D8B030D-6E8A-4147-A177-3AD203B41FA5}">
+                      <a16:colId xmlns:a16="http://schemas.microsoft.com/office/drawing/2014/main" val="1098196524"/>
+                    </a:ext>
+                  </a:extLst>
+                </a:gridCol>
+                <a:gridCol w="813014">
+                  <a:extLst>
+                    <a:ext uri="{9D8B030D-6E8A-4147-A177-3AD203B41FA5}">
+                      <a16:colId xmlns:a16="http://schemas.microsoft.com/office/drawing/2014/main" val="3033741062"/>
+                    </a:ext>
+                  </a:extLst>
+                </a:gridCol>
+                <a:gridCol w="813014">
+                  <a:extLst>
+                    <a:ext uri="{9D8B030D-6E8A-4147-A177-3AD203B41FA5}">
+                      <a16:colId xmlns:a16="http://schemas.microsoft.com/office/drawing/2014/main" val="314001702"/>
+                    </a:ext>
+                  </a:extLst>
+                </a:gridCol>
+                <a:gridCol w="813014">
+                  <a:extLst>
+                    <a:ext uri="{9D8B030D-6E8A-4147-A177-3AD203B41FA5}">
+                      <a16:colId xmlns:a16="http://schemas.microsoft.com/office/drawing/2014/main" val="1570671812"/>
+                    </a:ext>
+                  </a:extLst>
+                </a:gridCol>
+                <a:gridCol w="813014">
+                  <a:extLst>
+                    <a:ext uri="{9D8B030D-6E8A-4147-A177-3AD203B41FA5}">
+                      <a16:colId xmlns:a16="http://schemas.microsoft.com/office/drawing/2014/main" val="585183746"/>
+                    </a:ext>
+                  </a:extLst>
+                </a:gridCol>
+              </a:tblGrid>
+              <a:tr h="1925548">
+                <a:tc>
+                  <a:txBody>
+                    <a:bodyPr/>
+                    <a:lstStyle/>
+                    <a:p>
+                      <a:endParaRPr lang="en-US" dirty="0"/>
+                    </a:p>
+                  </a:txBody>
+                  <a:tcPr>
+                    <a:pattFill prst="wdDnDiag">
+                      <a:fgClr>
+                        <a:schemeClr val="tx1">
+                          <a:lumMod val="75000"/>
+                        </a:schemeClr>
+                      </a:fgClr>
+                      <a:bgClr>
+                        <a:schemeClr val="bg1"/>
+                      </a:bgClr>
+                    </a:pattFill>
+                  </a:tcPr>
+                </a:tc>
+                <a:tc>
+                  <a:txBody>
+                    <a:bodyPr/>
+                    <a:lstStyle/>
+                    <a:p>
+                      <a:endParaRPr lang="en-US" dirty="0"/>
+                    </a:p>
+                  </a:txBody>
+                  <a:tcPr>
+                    <a:pattFill prst="pct5">
+                      <a:fgClr>
+                        <a:schemeClr val="tx1">
+                          <a:lumMod val="75000"/>
+                        </a:schemeClr>
+                      </a:fgClr>
+                      <a:bgClr>
+                        <a:schemeClr val="bg1"/>
+                      </a:bgClr>
+                    </a:pattFill>
+                  </a:tcPr>
+                </a:tc>
+                <a:tc>
+                  <a:txBody>
+                    <a:bodyPr/>
+                    <a:lstStyle/>
+                    <a:p>
+                      <a:endParaRPr lang="en-US" dirty="0"/>
+                    </a:p>
+                  </a:txBody>
+                  <a:tcPr>
+                    <a:pattFill prst="sphere">
+                      <a:fgClr>
+                        <a:schemeClr val="tx1">
+                          <a:lumMod val="75000"/>
+                        </a:schemeClr>
+                      </a:fgClr>
+                      <a:bgClr>
+                        <a:schemeClr val="bg1"/>
+                      </a:bgClr>
+                    </a:pattFill>
+                  </a:tcPr>
+                </a:tc>
+                <a:tc>
+                  <a:txBody>
+                    <a:bodyPr/>
+                    <a:lstStyle/>
+                    <a:p>
+                      <a:endParaRPr lang="en-US" dirty="0"/>
+                    </a:p>
+                  </a:txBody>
+                  <a:tcPr>
+                    <a:pattFill prst="solidDmnd">
+                      <a:fgClr>
+                        <a:schemeClr val="tx1">
+                          <a:lumMod val="75000"/>
+                        </a:schemeClr>
+                      </a:fgClr>
+                      <a:bgClr>
+                        <a:schemeClr val="bg1"/>
+                      </a:bgClr>
+                    </a:pattFill>
+                  </a:tcPr>
+                </a:tc>
+                <a:tc>
+                  <a:txBody>
+                    <a:bodyPr/>
+                    <a:lstStyle/>
+                    <a:p>
+                      <a:endParaRPr lang="en-US" dirty="0"/>
+                    </a:p>
+                  </a:txBody>
+                  <a:tcPr>
+                    <a:pattFill prst="diagBrick">
+                      <a:fgClr>
+                        <a:schemeClr val="tx1">
+                          <a:lumMod val="75000"/>
+                        </a:schemeClr>
+                      </a:fgClr>
+                      <a:bgClr>
+                        <a:schemeClr val="bg1"/>
+                      </a:bgClr>
+                    </a:pattFill>
+                  </a:tcPr>
+                </a:tc>
+                <a:tc>
+                  <a:txBody>
+                    <a:bodyPr/>
+                    <a:lstStyle/>
+                    <a:p>
+                      <a:endParaRPr lang="en-US" dirty="0"/>
+                    </a:p>
+                  </a:txBody>
+                  <a:tcPr>
+                    <a:pattFill prst="horzBrick">
+                      <a:fgClr>
+                        <a:schemeClr val="tx1">
+                          <a:lumMod val="75000"/>
+                        </a:schemeClr>
+                      </a:fgClr>
+                      <a:bgClr>
+                        <a:schemeClr val="accent1"/>
+                      </a:bgClr>
+                    </a:pattFill>
+                  </a:tcPr>
+                </a:tc>
+                <a:tc>
+                  <a:txBody>
+                    <a:bodyPr/>
+                    <a:lstStyle/>
+                    <a:p>
+                      <a:endParaRPr lang="en-US" dirty="0"/>
+                    </a:p>
+                  </a:txBody>
+                  <a:tcPr>
+                    <a:pattFill prst="horzBrick">
+                      <a:fgClr>
+                        <a:srgbClr val="7030A0"/>
+                      </a:fgClr>
+                      <a:bgClr>
+                        <a:schemeClr val="bg1"/>
+                      </a:bgClr>
+                    </a:pattFill>
+                  </a:tcPr>
+                </a:tc>
+                <a:tc>
+                  <a:txBody>
+                    <a:bodyPr/>
+                    <a:lstStyle/>
+                    <a:p>
+                      <a:endParaRPr lang="en-US" dirty="0"/>
+                    </a:p>
+                  </a:txBody>
+                  <a:tcPr>
+                    <a:pattFill prst="dashUpDiag">
+                      <a:fgClr>
+                        <a:schemeClr val="tx1">
+                          <a:lumMod val="75000"/>
+                        </a:schemeClr>
+                      </a:fgClr>
+                      <a:bgClr>
+                        <a:schemeClr val="bg1"/>
+                      </a:bgClr>
+                    </a:pattFill>
+                  </a:tcPr>
+                </a:tc>
+                <a:tc>
+                  <a:txBody>
+                    <a:bodyPr/>
+                    <a:lstStyle/>
+                    <a:p>
+                      <a:endParaRPr lang="en-US" dirty="0"/>
+                    </a:p>
+                  </a:txBody>
+                  <a:tcPr>
+                    <a:pattFill prst="horzBrick">
+                      <a:fgClr>
+                        <a:schemeClr val="tx1">
+                          <a:lumMod val="75000"/>
+                        </a:schemeClr>
+                      </a:fgClr>
+                      <a:bgClr>
+                        <a:srgbClr val="00B0F0"/>
+                      </a:bgClr>
+                    </a:pattFill>
+                  </a:tcPr>
+                </a:tc>
+                <a:extLst>
+                  <a:ext uri="{0D108BD9-81ED-4DB2-BD59-A6C34878D82A}">
+                    <a16:rowId xmlns:a16="http://schemas.microsoft.com/office/drawing/2014/main" val="1085360998"/>
+                  </a:ext>
+                </a:extLst>
+              </a:tr>
+            </a:tbl>
+          </a:graphicData>
+        </a:graphic>
+      </p:graphicFrame>
     </p:spTree>
     <p:extLst>
       <p:ext uri="{BB962C8B-B14F-4D97-AF65-F5344CB8AC3E}">

</xml_diff>